<commit_message>
add changes on präsi
</commit_message>
<xml_diff>
--- a/Präsentation/Methodik und Werkzeuge.pptx
+++ b/Präsentation/Methodik und Werkzeuge.pptx
@@ -4,13 +4,16 @@
   <p:sldMasterIdLst>
     <p:sldMasterId id="2147483648" r:id="rId1"/>
   </p:sldMasterIdLst>
+  <p:notesMasterIdLst>
+    <p:notesMasterId r:id="rId8"/>
+  </p:notesMasterIdLst>
   <p:sldIdLst>
     <p:sldId id="256" r:id="rId2"/>
-    <p:sldId id="257" r:id="rId3"/>
-    <p:sldId id="258" r:id="rId4"/>
-    <p:sldId id="259" r:id="rId5"/>
-    <p:sldId id="260" r:id="rId6"/>
-    <p:sldId id="261" r:id="rId7"/>
+    <p:sldId id="258" r:id="rId3"/>
+    <p:sldId id="259" r:id="rId4"/>
+    <p:sldId id="260" r:id="rId5"/>
+    <p:sldId id="261" r:id="rId6"/>
+    <p:sldId id="257" r:id="rId7"/>
   </p:sldIdLst>
   <p:sldSz cx="12192000" cy="6858000"/>
   <p:notesSz cx="6858000" cy="9144000"/>
@@ -109,26 +112,46 @@
       </a:defRPr>
     </a:lvl9pPr>
   </p:defaultTextStyle>
+  <p:extLst>
+    <p:ext uri="{EFAFB233-063F-42B5-8137-9DF3F51BA10A}">
+      <p15:sldGuideLst xmlns:p15="http://schemas.microsoft.com/office/powerpoint/2012/main"/>
+    </p:ext>
+  </p:extLst>
 </p:presentation>
+</file>
+
+<file path=ppt/revisionInfo.xml><?xml version="1.0" encoding="utf-8"?>
+<p1510:revInfo xmlns:a="http://schemas.openxmlformats.org/drawingml/2006/main" xmlns:r="http://schemas.openxmlformats.org/officeDocument/2006/relationships" xmlns:p1510="http://schemas.microsoft.com/office/powerpoint/2015/10/main">
+  <p1510:revLst>
+    <p1510:client id="{1DD87957-0B5A-4D88-B111-46F716828A6A}" v="84" dt="2022-01-19T12:33:28.227"/>
+  </p1510:revLst>
+</p1510:revInfo>
 </file>
 
 <file path=ppt/changesInfos/changesInfo1.xml><?xml version="1.0" encoding="utf-8"?>
 <pc:chgInfo xmlns:a="http://schemas.openxmlformats.org/drawingml/2006/main" xmlns:r="http://schemas.openxmlformats.org/officeDocument/2006/relationships" xmlns:ac="http://schemas.microsoft.com/office/drawing/2013/main/command" xmlns:pc="http://schemas.microsoft.com/office/powerpoint/2013/main/command">
   <pc:docChgLst>
     <pc:chgData name="Thomas Mandelz" userId="8d3a597e08c542e1" providerId="LiveId" clId="{1DD87957-0B5A-4D88-B111-46F716828A6A}"/>
-    <pc:docChg chg="custSel addSld modSld">
-      <pc:chgData name="Thomas Mandelz" userId="8d3a597e08c542e1" providerId="LiveId" clId="{1DD87957-0B5A-4D88-B111-46F716828A6A}" dt="2022-01-08T10:25:40.952" v="593" actId="20577"/>
+    <pc:docChg chg="undo custSel addSld modSld sldOrd">
+      <pc:chgData name="Thomas Mandelz" userId="8d3a597e08c542e1" providerId="LiveId" clId="{1DD87957-0B5A-4D88-B111-46F716828A6A}" dt="2022-01-19T12:33:28.223" v="2451" actId="1076"/>
       <pc:docMkLst>
         <pc:docMk/>
       </pc:docMkLst>
-      <pc:sldChg chg="modSp mod">
-        <pc:chgData name="Thomas Mandelz" userId="8d3a597e08c542e1" providerId="LiveId" clId="{1DD87957-0B5A-4D88-B111-46F716828A6A}" dt="2022-01-08T10:23:45.595" v="364" actId="20577"/>
+      <pc:sldChg chg="modNotesTx">
+        <pc:chgData name="Thomas Mandelz" userId="8d3a597e08c542e1" providerId="LiveId" clId="{1DD87957-0B5A-4D88-B111-46F716828A6A}" dt="2022-01-19T10:33:34.373" v="737" actId="20577"/>
+        <pc:sldMkLst>
+          <pc:docMk/>
+          <pc:sldMk cId="1198096788" sldId="256"/>
+        </pc:sldMkLst>
+      </pc:sldChg>
+      <pc:sldChg chg="modSp mod ord modNotesTx">
+        <pc:chgData name="Thomas Mandelz" userId="8d3a597e08c542e1" providerId="LiveId" clId="{1DD87957-0B5A-4D88-B111-46F716828A6A}" dt="2022-01-19T10:39:16.925" v="1458"/>
         <pc:sldMkLst>
           <pc:docMk/>
           <pc:sldMk cId="3901308089" sldId="257"/>
         </pc:sldMkLst>
         <pc:spChg chg="mod">
-          <ac:chgData name="Thomas Mandelz" userId="8d3a597e08c542e1" providerId="LiveId" clId="{1DD87957-0B5A-4D88-B111-46F716828A6A}" dt="2022-01-08T10:23:45.595" v="364" actId="20577"/>
+          <ac:chgData name="Thomas Mandelz" userId="8d3a597e08c542e1" providerId="LiveId" clId="{1DD87957-0B5A-4D88-B111-46F716828A6A}" dt="2022-01-19T10:36:45.755" v="1117" actId="20577"/>
           <ac:spMkLst>
             <pc:docMk/>
             <pc:sldMk cId="3901308089" sldId="257"/>
@@ -136,31 +159,166 @@
           </ac:spMkLst>
         </pc:spChg>
       </pc:sldChg>
-      <pc:sldChg chg="modSp new mod">
-        <pc:chgData name="Thomas Mandelz" userId="8d3a597e08c542e1" providerId="LiveId" clId="{1DD87957-0B5A-4D88-B111-46F716828A6A}" dt="2022-01-08T10:22:07.809" v="226" actId="20577"/>
+      <pc:sldChg chg="addSp delSp modSp mod ord setBg modNotesTx">
+        <pc:chgData name="Thomas Mandelz" userId="8d3a597e08c542e1" providerId="LiveId" clId="{1DD87957-0B5A-4D88-B111-46F716828A6A}" dt="2022-01-19T12:21:22.250" v="2309" actId="1076"/>
+        <pc:sldMkLst>
+          <pc:docMk/>
+          <pc:sldMk cId="4081397304" sldId="258"/>
+        </pc:sldMkLst>
+        <pc:spChg chg="mod">
+          <ac:chgData name="Thomas Mandelz" userId="8d3a597e08c542e1" providerId="LiveId" clId="{1DD87957-0B5A-4D88-B111-46F716828A6A}" dt="2022-01-19T10:53:29.955" v="1591" actId="26606"/>
+          <ac:spMkLst>
+            <pc:docMk/>
+            <pc:sldMk cId="4081397304" sldId="258"/>
+            <ac:spMk id="2" creationId="{9B2E639B-1879-4C21-B581-9CA021F14725}"/>
+          </ac:spMkLst>
+        </pc:spChg>
+        <pc:spChg chg="mod">
+          <ac:chgData name="Thomas Mandelz" userId="8d3a597e08c542e1" providerId="LiveId" clId="{1DD87957-0B5A-4D88-B111-46F716828A6A}" dt="2022-01-19T10:53:29.955" v="1591" actId="26606"/>
+          <ac:spMkLst>
+            <pc:docMk/>
+            <pc:sldMk cId="4081397304" sldId="258"/>
+            <ac:spMk id="3" creationId="{81E25CF7-F6AE-4E1A-AAFA-15BE43C99247}"/>
+          </ac:spMkLst>
+        </pc:spChg>
+        <pc:spChg chg="add del mod">
+          <ac:chgData name="Thomas Mandelz" userId="8d3a597e08c542e1" providerId="LiveId" clId="{1DD87957-0B5A-4D88-B111-46F716828A6A}" dt="2022-01-19T10:46:20.915" v="1572" actId="478"/>
+          <ac:spMkLst>
+            <pc:docMk/>
+            <pc:sldMk cId="4081397304" sldId="258"/>
+            <ac:spMk id="4" creationId="{A83654EE-7744-45EA-AC1C-9CF9BFFEA02D}"/>
+          </ac:spMkLst>
+        </pc:spChg>
+        <pc:spChg chg="add del">
+          <ac:chgData name="Thomas Mandelz" userId="8d3a597e08c542e1" providerId="LiveId" clId="{1DD87957-0B5A-4D88-B111-46F716828A6A}" dt="2022-01-19T10:53:29.955" v="1591" actId="26606"/>
+          <ac:spMkLst>
+            <pc:docMk/>
+            <pc:sldMk cId="4081397304" sldId="258"/>
+            <ac:spMk id="11" creationId="{5E39A796-BE83-48B1-B33F-35C4A32AAB57}"/>
+          </ac:spMkLst>
+        </pc:spChg>
+        <pc:spChg chg="add del">
+          <ac:chgData name="Thomas Mandelz" userId="8d3a597e08c542e1" providerId="LiveId" clId="{1DD87957-0B5A-4D88-B111-46F716828A6A}" dt="2022-01-19T10:53:29.955" v="1591" actId="26606"/>
+          <ac:spMkLst>
+            <pc:docMk/>
+            <pc:sldMk cId="4081397304" sldId="258"/>
+            <ac:spMk id="13" creationId="{72F84B47-E267-4194-8194-831DB7B5547F}"/>
+          </ac:spMkLst>
+        </pc:spChg>
+        <pc:picChg chg="add mod">
+          <ac:chgData name="Thomas Mandelz" userId="8d3a597e08c542e1" providerId="LiveId" clId="{1DD87957-0B5A-4D88-B111-46F716828A6A}" dt="2022-01-19T12:21:22.250" v="2309" actId="1076"/>
+          <ac:picMkLst>
+            <pc:docMk/>
+            <pc:sldMk cId="4081397304" sldId="258"/>
+            <ac:picMk id="6" creationId="{28E98A74-1817-4503-8B1A-DE4DF558973E}"/>
+          </ac:picMkLst>
+        </pc:picChg>
+      </pc:sldChg>
+      <pc:sldChg chg="addSp delSp modSp new mod setBg modNotesTx">
+        <pc:chgData name="Thomas Mandelz" userId="8d3a597e08c542e1" providerId="LiveId" clId="{1DD87957-0B5A-4D88-B111-46F716828A6A}" dt="2022-01-19T12:33:28.223" v="2451" actId="1076"/>
         <pc:sldMkLst>
           <pc:docMk/>
           <pc:sldMk cId="1842362962" sldId="259"/>
         </pc:sldMkLst>
         <pc:spChg chg="mod">
-          <ac:chgData name="Thomas Mandelz" userId="8d3a597e08c542e1" providerId="LiveId" clId="{1DD87957-0B5A-4D88-B111-46F716828A6A}" dt="2022-01-08T10:20:23.494" v="27" actId="20577"/>
+          <ac:chgData name="Thomas Mandelz" userId="8d3a597e08c542e1" providerId="LiveId" clId="{1DD87957-0B5A-4D88-B111-46F716828A6A}" dt="2022-01-19T12:26:22.213" v="2342" actId="26606"/>
           <ac:spMkLst>
             <pc:docMk/>
             <pc:sldMk cId="1842362962" sldId="259"/>
             <ac:spMk id="2" creationId="{3FFE9CB6-6A95-49F4-849D-F350E1FACA32}"/>
           </ac:spMkLst>
         </pc:spChg>
-        <pc:spChg chg="mod">
-          <ac:chgData name="Thomas Mandelz" userId="8d3a597e08c542e1" providerId="LiveId" clId="{1DD87957-0B5A-4D88-B111-46F716828A6A}" dt="2022-01-08T10:22:07.809" v="226" actId="20577"/>
+        <pc:spChg chg="del mod">
+          <ac:chgData name="Thomas Mandelz" userId="8d3a597e08c542e1" providerId="LiveId" clId="{1DD87957-0B5A-4D88-B111-46F716828A6A}" dt="2022-01-19T12:27:26.435" v="2360" actId="478"/>
           <ac:spMkLst>
             <pc:docMk/>
             <pc:sldMk cId="1842362962" sldId="259"/>
             <ac:spMk id="3" creationId="{E3AEC211-0CD6-4AE2-9D10-58A5068A3B3C}"/>
           </ac:spMkLst>
         </pc:spChg>
+        <pc:spChg chg="add del">
+          <ac:chgData name="Thomas Mandelz" userId="8d3a597e08c542e1" providerId="LiveId" clId="{1DD87957-0B5A-4D88-B111-46F716828A6A}" dt="2022-01-19T12:26:22.213" v="2342" actId="26606"/>
+          <ac:spMkLst>
+            <pc:docMk/>
+            <pc:sldMk cId="1842362962" sldId="259"/>
+            <ac:spMk id="71" creationId="{0550F5B9-399F-4FAD-AE6C-ED65F9A43A74}"/>
+          </ac:spMkLst>
+        </pc:spChg>
+        <pc:spChg chg="add del">
+          <ac:chgData name="Thomas Mandelz" userId="8d3a597e08c542e1" providerId="LiveId" clId="{1DD87957-0B5A-4D88-B111-46F716828A6A}" dt="2022-01-19T12:26:22.213" v="2342" actId="26606"/>
+          <ac:spMkLst>
+            <pc:docMk/>
+            <pc:sldMk cId="1842362962" sldId="259"/>
+            <ac:spMk id="73" creationId="{C062E60F-5CD4-4268-8359-8076634680E5}"/>
+          </ac:spMkLst>
+        </pc:spChg>
+        <pc:spChg chg="add del">
+          <ac:chgData name="Thomas Mandelz" userId="8d3a597e08c542e1" providerId="LiveId" clId="{1DD87957-0B5A-4D88-B111-46F716828A6A}" dt="2022-01-19T12:26:22.213" v="2342" actId="26606"/>
+          <ac:spMkLst>
+            <pc:docMk/>
+            <pc:sldMk cId="1842362962" sldId="259"/>
+            <ac:spMk id="75" creationId="{BB341EC3-1810-4D33-BA3F-E2D0AA0ECFB6}"/>
+          </ac:spMkLst>
+        </pc:spChg>
+        <pc:spChg chg="add del">
+          <ac:chgData name="Thomas Mandelz" userId="8d3a597e08c542e1" providerId="LiveId" clId="{1DD87957-0B5A-4D88-B111-46F716828A6A}" dt="2022-01-19T12:26:22.213" v="2342" actId="26606"/>
+          <ac:spMkLst>
+            <pc:docMk/>
+            <pc:sldMk cId="1842362962" sldId="259"/>
+            <ac:spMk id="77" creationId="{10127CDE-2B99-47A8-BB3C-7D17519105E0}"/>
+          </ac:spMkLst>
+        </pc:spChg>
+        <pc:graphicFrameChg chg="add mod modGraphic">
+          <ac:chgData name="Thomas Mandelz" userId="8d3a597e08c542e1" providerId="LiveId" clId="{1DD87957-0B5A-4D88-B111-46F716828A6A}" dt="2022-01-19T12:33:02.036" v="2446" actId="1036"/>
+          <ac:graphicFrameMkLst>
+            <pc:docMk/>
+            <pc:sldMk cId="1842362962" sldId="259"/>
+            <ac:graphicFrameMk id="7" creationId="{82505E29-5BE0-4C62-9428-2896888670AE}"/>
+          </ac:graphicFrameMkLst>
+        </pc:graphicFrameChg>
+        <pc:picChg chg="add del mod">
+          <ac:chgData name="Thomas Mandelz" userId="8d3a597e08c542e1" providerId="LiveId" clId="{1DD87957-0B5A-4D88-B111-46F716828A6A}" dt="2022-01-19T12:19:15.130" v="2306" actId="478"/>
+          <ac:picMkLst>
+            <pc:docMk/>
+            <pc:sldMk cId="1842362962" sldId="259"/>
+            <ac:picMk id="5" creationId="{5F44A4F2-D77D-4B98-9842-2AC314C27331}"/>
+          </ac:picMkLst>
+        </pc:picChg>
+        <pc:picChg chg="add mod ord">
+          <ac:chgData name="Thomas Mandelz" userId="8d3a597e08c542e1" providerId="LiveId" clId="{1DD87957-0B5A-4D88-B111-46F716828A6A}" dt="2022-01-19T12:33:28.223" v="2451" actId="1076"/>
+          <ac:picMkLst>
+            <pc:docMk/>
+            <pc:sldMk cId="1842362962" sldId="259"/>
+            <ac:picMk id="6" creationId="{7377A287-63F7-41F6-A8BB-A5E78E0ABDFB}"/>
+          </ac:picMkLst>
+        </pc:picChg>
+        <pc:picChg chg="add mod">
+          <ac:chgData name="Thomas Mandelz" userId="8d3a597e08c542e1" providerId="LiveId" clId="{1DD87957-0B5A-4D88-B111-46F716828A6A}" dt="2022-01-19T12:33:10.676" v="2447" actId="1076"/>
+          <ac:picMkLst>
+            <pc:docMk/>
+            <pc:sldMk cId="1842362962" sldId="259"/>
+            <ac:picMk id="14" creationId="{2118A5B7-7A76-41AF-A80A-A8277CDA9F7E}"/>
+          </ac:picMkLst>
+        </pc:picChg>
+        <pc:picChg chg="add mod">
+          <ac:chgData name="Thomas Mandelz" userId="8d3a597e08c542e1" providerId="LiveId" clId="{1DD87957-0B5A-4D88-B111-46F716828A6A}" dt="2022-01-19T12:33:25.468" v="2450" actId="1076"/>
+          <ac:picMkLst>
+            <pc:docMk/>
+            <pc:sldMk cId="1842362962" sldId="259"/>
+            <ac:picMk id="3073" creationId="{44C75F72-656C-4287-AD88-3F781CF61D82}"/>
+          </ac:picMkLst>
+        </pc:picChg>
+        <pc:picChg chg="add del mod">
+          <ac:chgData name="Thomas Mandelz" userId="8d3a597e08c542e1" providerId="LiveId" clId="{1DD87957-0B5A-4D88-B111-46F716828A6A}" dt="2022-01-19T12:27:00.838" v="2349" actId="21"/>
+          <ac:picMkLst>
+            <pc:docMk/>
+            <pc:sldMk cId="1842362962" sldId="259"/>
+            <ac:picMk id="3074" creationId="{AA8522B9-1209-4B11-BA52-1C287A2FD44F}"/>
+          </ac:picMkLst>
+        </pc:picChg>
       </pc:sldChg>
-      <pc:sldChg chg="modSp new mod">
-        <pc:chgData name="Thomas Mandelz" userId="8d3a597e08c542e1" providerId="LiveId" clId="{1DD87957-0B5A-4D88-B111-46F716828A6A}" dt="2022-01-08T10:24:25.363" v="486" actId="20577"/>
+      <pc:sldChg chg="addSp delSp modSp new mod modNotesTx">
+        <pc:chgData name="Thomas Mandelz" userId="8d3a597e08c542e1" providerId="LiveId" clId="{1DD87957-0B5A-4D88-B111-46F716828A6A}" dt="2022-01-19T12:23:41.719" v="2316" actId="21"/>
         <pc:sldMkLst>
           <pc:docMk/>
           <pc:sldMk cId="950212034" sldId="260"/>
@@ -174,16 +332,32 @@
           </ac:spMkLst>
         </pc:spChg>
         <pc:spChg chg="mod">
-          <ac:chgData name="Thomas Mandelz" userId="8d3a597e08c542e1" providerId="LiveId" clId="{1DD87957-0B5A-4D88-B111-46F716828A6A}" dt="2022-01-08T10:24:25.363" v="486" actId="20577"/>
+          <ac:chgData name="Thomas Mandelz" userId="8d3a597e08c542e1" providerId="LiveId" clId="{1DD87957-0B5A-4D88-B111-46F716828A6A}" dt="2022-01-19T12:23:37.229" v="2314" actId="1076"/>
           <ac:spMkLst>
             <pc:docMk/>
             <pc:sldMk cId="950212034" sldId="260"/>
             <ac:spMk id="3" creationId="{4E2E7064-02ED-49A7-AA6B-1FDDC1EC4EB8}"/>
           </ac:spMkLst>
         </pc:spChg>
+        <pc:spChg chg="add del">
+          <ac:chgData name="Thomas Mandelz" userId="8d3a597e08c542e1" providerId="LiveId" clId="{1DD87957-0B5A-4D88-B111-46F716828A6A}" dt="2022-01-19T12:23:28.028" v="2311"/>
+          <ac:spMkLst>
+            <pc:docMk/>
+            <pc:sldMk cId="950212034" sldId="260"/>
+            <ac:spMk id="4" creationId="{422A215C-7C31-42E1-843B-BAA27833FC1A}"/>
+          </ac:spMkLst>
+        </pc:spChg>
+        <pc:picChg chg="add del mod">
+          <ac:chgData name="Thomas Mandelz" userId="8d3a597e08c542e1" providerId="LiveId" clId="{1DD87957-0B5A-4D88-B111-46F716828A6A}" dt="2022-01-19T12:23:41.719" v="2316" actId="21"/>
+          <ac:picMkLst>
+            <pc:docMk/>
+            <pc:sldMk cId="950212034" sldId="260"/>
+            <ac:picMk id="2050" creationId="{BC30C5B7-006F-43E1-832A-F563221B6882}"/>
+          </ac:picMkLst>
+        </pc:picChg>
       </pc:sldChg>
-      <pc:sldChg chg="modSp new mod">
-        <pc:chgData name="Thomas Mandelz" userId="8d3a597e08c542e1" providerId="LiveId" clId="{1DD87957-0B5A-4D88-B111-46F716828A6A}" dt="2022-01-08T10:25:40.952" v="593" actId="20577"/>
+      <pc:sldChg chg="modSp new mod modNotesTx">
+        <pc:chgData name="Thomas Mandelz" userId="8d3a597e08c542e1" providerId="LiveId" clId="{1DD87957-0B5A-4D88-B111-46F716828A6A}" dt="2022-01-19T12:17:21.475" v="2301" actId="20577"/>
         <pc:sldMkLst>
           <pc:docMk/>
           <pc:sldMk cId="1608520051" sldId="261"/>
@@ -208,6 +382,1832 @@
     </pc:docChg>
   </pc:docChgLst>
 </pc:chgInfo>
+</file>
+
+<file path=ppt/notesMasters/notesMaster1.xml><?xml version="1.0" encoding="utf-8"?>
+<p:notesMaster xmlns:a="http://schemas.openxmlformats.org/drawingml/2006/main" xmlns:r="http://schemas.openxmlformats.org/officeDocument/2006/relationships" xmlns:p="http://schemas.openxmlformats.org/presentationml/2006/main">
+  <p:cSld>
+    <p:bg>
+      <p:bgRef idx="1001">
+        <a:schemeClr val="bg1"/>
+      </p:bgRef>
+    </p:bg>
+    <p:spTree>
+      <p:nvGrpSpPr>
+        <p:cNvPr id="1" name=""/>
+        <p:cNvGrpSpPr/>
+        <p:nvPr/>
+      </p:nvGrpSpPr>
+      <p:grpSpPr>
+        <a:xfrm>
+          <a:off x="0" y="0"/>
+          <a:ext cx="0" cy="0"/>
+          <a:chOff x="0" y="0"/>
+          <a:chExt cx="0" cy="0"/>
+        </a:xfrm>
+      </p:grpSpPr>
+      <p:sp>
+        <p:nvSpPr>
+          <p:cNvPr id="2" name="Header Placeholder 1"/>
+          <p:cNvSpPr>
+            <a:spLocks noGrp="1"/>
+          </p:cNvSpPr>
+          <p:nvPr>
+            <p:ph type="hdr" sz="quarter"/>
+          </p:nvPr>
+        </p:nvSpPr>
+        <p:spPr>
+          <a:xfrm>
+            <a:off x="0" y="0"/>
+            <a:ext cx="2971800" cy="458788"/>
+          </a:xfrm>
+          <a:prstGeom prst="rect">
+            <a:avLst/>
+          </a:prstGeom>
+        </p:spPr>
+        <p:txBody>
+          <a:bodyPr vert="horz" lIns="91440" tIns="45720" rIns="91440" bIns="45720" rtlCol="0"/>
+          <a:lstStyle>
+            <a:lvl1pPr algn="l">
+              <a:defRPr sz="1200"/>
+            </a:lvl1pPr>
+          </a:lstStyle>
+          <a:p>
+            <a:endParaRPr lang="de-CH"/>
+          </a:p>
+        </p:txBody>
+      </p:sp>
+      <p:sp>
+        <p:nvSpPr>
+          <p:cNvPr id="3" name="Date Placeholder 2"/>
+          <p:cNvSpPr>
+            <a:spLocks noGrp="1"/>
+          </p:cNvSpPr>
+          <p:nvPr>
+            <p:ph type="dt" idx="1"/>
+          </p:nvPr>
+        </p:nvSpPr>
+        <p:spPr>
+          <a:xfrm>
+            <a:off x="3884613" y="0"/>
+            <a:ext cx="2971800" cy="458788"/>
+          </a:xfrm>
+          <a:prstGeom prst="rect">
+            <a:avLst/>
+          </a:prstGeom>
+        </p:spPr>
+        <p:txBody>
+          <a:bodyPr vert="horz" lIns="91440" tIns="45720" rIns="91440" bIns="45720" rtlCol="0"/>
+          <a:lstStyle>
+            <a:lvl1pPr algn="r">
+              <a:defRPr sz="1200"/>
+            </a:lvl1pPr>
+          </a:lstStyle>
+          <a:p>
+            <a:fld id="{17501187-B422-4BA4-88F2-40F66592B634}" type="datetimeFigureOut">
+              <a:rPr lang="de-CH" smtClean="0"/>
+              <a:t>19.01.2022</a:t>
+            </a:fld>
+            <a:endParaRPr lang="de-CH"/>
+          </a:p>
+        </p:txBody>
+      </p:sp>
+      <p:sp>
+        <p:nvSpPr>
+          <p:cNvPr id="4" name="Slide Image Placeholder 3"/>
+          <p:cNvSpPr>
+            <a:spLocks noGrp="1" noRot="1" noChangeAspect="1"/>
+          </p:cNvSpPr>
+          <p:nvPr>
+            <p:ph type="sldImg" idx="2"/>
+          </p:nvPr>
+        </p:nvSpPr>
+        <p:spPr>
+          <a:xfrm>
+            <a:off x="685800" y="1143000"/>
+            <a:ext cx="5486400" cy="3086100"/>
+          </a:xfrm>
+          <a:prstGeom prst="rect">
+            <a:avLst/>
+          </a:prstGeom>
+          <a:noFill/>
+          <a:ln w="12700">
+            <a:solidFill>
+              <a:prstClr val="black"/>
+            </a:solidFill>
+          </a:ln>
+        </p:spPr>
+        <p:txBody>
+          <a:bodyPr vert="horz" lIns="91440" tIns="45720" rIns="91440" bIns="45720" rtlCol="0" anchor="ctr"/>
+          <a:lstStyle/>
+          <a:p>
+            <a:endParaRPr lang="de-CH"/>
+          </a:p>
+        </p:txBody>
+      </p:sp>
+      <p:sp>
+        <p:nvSpPr>
+          <p:cNvPr id="5" name="Notes Placeholder 4"/>
+          <p:cNvSpPr>
+            <a:spLocks noGrp="1"/>
+          </p:cNvSpPr>
+          <p:nvPr>
+            <p:ph type="body" sz="quarter" idx="3"/>
+          </p:nvPr>
+        </p:nvSpPr>
+        <p:spPr>
+          <a:xfrm>
+            <a:off x="685800" y="4400550"/>
+            <a:ext cx="5486400" cy="3600450"/>
+          </a:xfrm>
+          <a:prstGeom prst="rect">
+            <a:avLst/>
+          </a:prstGeom>
+        </p:spPr>
+        <p:txBody>
+          <a:bodyPr vert="horz" lIns="91440" tIns="45720" rIns="91440" bIns="45720" rtlCol="0"/>
+          <a:lstStyle/>
+          <a:p>
+            <a:pPr lvl="0"/>
+            <a:r>
+              <a:rPr lang="en-US"/>
+              <a:t>Click to edit Master text styles</a:t>
+            </a:r>
+          </a:p>
+          <a:p>
+            <a:pPr lvl="1"/>
+            <a:r>
+              <a:rPr lang="en-US"/>
+              <a:t>Second level</a:t>
+            </a:r>
+          </a:p>
+          <a:p>
+            <a:pPr lvl="2"/>
+            <a:r>
+              <a:rPr lang="en-US"/>
+              <a:t>Third level</a:t>
+            </a:r>
+          </a:p>
+          <a:p>
+            <a:pPr lvl="3"/>
+            <a:r>
+              <a:rPr lang="en-US"/>
+              <a:t>Fourth level</a:t>
+            </a:r>
+          </a:p>
+          <a:p>
+            <a:pPr lvl="4"/>
+            <a:r>
+              <a:rPr lang="en-US"/>
+              <a:t>Fifth level</a:t>
+            </a:r>
+            <a:endParaRPr lang="de-CH"/>
+          </a:p>
+        </p:txBody>
+      </p:sp>
+      <p:sp>
+        <p:nvSpPr>
+          <p:cNvPr id="6" name="Footer Placeholder 5"/>
+          <p:cNvSpPr>
+            <a:spLocks noGrp="1"/>
+          </p:cNvSpPr>
+          <p:nvPr>
+            <p:ph type="ftr" sz="quarter" idx="4"/>
+          </p:nvPr>
+        </p:nvSpPr>
+        <p:spPr>
+          <a:xfrm>
+            <a:off x="0" y="8685213"/>
+            <a:ext cx="2971800" cy="458787"/>
+          </a:xfrm>
+          <a:prstGeom prst="rect">
+            <a:avLst/>
+          </a:prstGeom>
+        </p:spPr>
+        <p:txBody>
+          <a:bodyPr vert="horz" lIns="91440" tIns="45720" rIns="91440" bIns="45720" rtlCol="0" anchor="b"/>
+          <a:lstStyle>
+            <a:lvl1pPr algn="l">
+              <a:defRPr sz="1200"/>
+            </a:lvl1pPr>
+          </a:lstStyle>
+          <a:p>
+            <a:endParaRPr lang="de-CH"/>
+          </a:p>
+        </p:txBody>
+      </p:sp>
+      <p:sp>
+        <p:nvSpPr>
+          <p:cNvPr id="7" name="Slide Number Placeholder 6"/>
+          <p:cNvSpPr>
+            <a:spLocks noGrp="1"/>
+          </p:cNvSpPr>
+          <p:nvPr>
+            <p:ph type="sldNum" sz="quarter" idx="5"/>
+          </p:nvPr>
+        </p:nvSpPr>
+        <p:spPr>
+          <a:xfrm>
+            <a:off x="3884613" y="8685213"/>
+            <a:ext cx="2971800" cy="458787"/>
+          </a:xfrm>
+          <a:prstGeom prst="rect">
+            <a:avLst/>
+          </a:prstGeom>
+        </p:spPr>
+        <p:txBody>
+          <a:bodyPr vert="horz" lIns="91440" tIns="45720" rIns="91440" bIns="45720" rtlCol="0" anchor="b"/>
+          <a:lstStyle>
+            <a:lvl1pPr algn="r">
+              <a:defRPr sz="1200"/>
+            </a:lvl1pPr>
+          </a:lstStyle>
+          <a:p>
+            <a:fld id="{875D5C37-5F59-4FB3-BEF9-55AD76D26E10}" type="slidenum">
+              <a:rPr lang="de-CH" smtClean="0"/>
+              <a:t>‹#›</a:t>
+            </a:fld>
+            <a:endParaRPr lang="de-CH"/>
+          </a:p>
+        </p:txBody>
+      </p:sp>
+    </p:spTree>
+    <p:extLst>
+      <p:ext uri="{BB962C8B-B14F-4D97-AF65-F5344CB8AC3E}">
+        <p14:creationId xmlns:p14="http://schemas.microsoft.com/office/powerpoint/2010/main" val="2685108349"/>
+      </p:ext>
+    </p:extLst>
+  </p:cSld>
+  <p:clrMap bg1="lt1" tx1="dk1" bg2="lt2" tx2="dk2" accent1="accent1" accent2="accent2" accent3="accent3" accent4="accent4" accent5="accent5" accent6="accent6" hlink="hlink" folHlink="folHlink"/>
+  <p:notesStyle>
+    <a:lvl1pPr marL="0" algn="l" defTabSz="914400" rtl="0" eaLnBrk="1" latinLnBrk="0" hangingPunct="1">
+      <a:defRPr sz="1200" kern="1200">
+        <a:solidFill>
+          <a:schemeClr val="tx1"/>
+        </a:solidFill>
+        <a:latin typeface="+mn-lt"/>
+        <a:ea typeface="+mn-ea"/>
+        <a:cs typeface="+mn-cs"/>
+      </a:defRPr>
+    </a:lvl1pPr>
+    <a:lvl2pPr marL="457200" algn="l" defTabSz="914400" rtl="0" eaLnBrk="1" latinLnBrk="0" hangingPunct="1">
+      <a:defRPr sz="1200" kern="1200">
+        <a:solidFill>
+          <a:schemeClr val="tx1"/>
+        </a:solidFill>
+        <a:latin typeface="+mn-lt"/>
+        <a:ea typeface="+mn-ea"/>
+        <a:cs typeface="+mn-cs"/>
+      </a:defRPr>
+    </a:lvl2pPr>
+    <a:lvl3pPr marL="914400" algn="l" defTabSz="914400" rtl="0" eaLnBrk="1" latinLnBrk="0" hangingPunct="1">
+      <a:defRPr sz="1200" kern="1200">
+        <a:solidFill>
+          <a:schemeClr val="tx1"/>
+        </a:solidFill>
+        <a:latin typeface="+mn-lt"/>
+        <a:ea typeface="+mn-ea"/>
+        <a:cs typeface="+mn-cs"/>
+      </a:defRPr>
+    </a:lvl3pPr>
+    <a:lvl4pPr marL="1371600" algn="l" defTabSz="914400" rtl="0" eaLnBrk="1" latinLnBrk="0" hangingPunct="1">
+      <a:defRPr sz="1200" kern="1200">
+        <a:solidFill>
+          <a:schemeClr val="tx1"/>
+        </a:solidFill>
+        <a:latin typeface="+mn-lt"/>
+        <a:ea typeface="+mn-ea"/>
+        <a:cs typeface="+mn-cs"/>
+      </a:defRPr>
+    </a:lvl4pPr>
+    <a:lvl5pPr marL="1828800" algn="l" defTabSz="914400" rtl="0" eaLnBrk="1" latinLnBrk="0" hangingPunct="1">
+      <a:defRPr sz="1200" kern="1200">
+        <a:solidFill>
+          <a:schemeClr val="tx1"/>
+        </a:solidFill>
+        <a:latin typeface="+mn-lt"/>
+        <a:ea typeface="+mn-ea"/>
+        <a:cs typeface="+mn-cs"/>
+      </a:defRPr>
+    </a:lvl5pPr>
+    <a:lvl6pPr marL="2286000" algn="l" defTabSz="914400" rtl="0" eaLnBrk="1" latinLnBrk="0" hangingPunct="1">
+      <a:defRPr sz="1200" kern="1200">
+        <a:solidFill>
+          <a:schemeClr val="tx1"/>
+        </a:solidFill>
+        <a:latin typeface="+mn-lt"/>
+        <a:ea typeface="+mn-ea"/>
+        <a:cs typeface="+mn-cs"/>
+      </a:defRPr>
+    </a:lvl6pPr>
+    <a:lvl7pPr marL="2743200" algn="l" defTabSz="914400" rtl="0" eaLnBrk="1" latinLnBrk="0" hangingPunct="1">
+      <a:defRPr sz="1200" kern="1200">
+        <a:solidFill>
+          <a:schemeClr val="tx1"/>
+        </a:solidFill>
+        <a:latin typeface="+mn-lt"/>
+        <a:ea typeface="+mn-ea"/>
+        <a:cs typeface="+mn-cs"/>
+      </a:defRPr>
+    </a:lvl7pPr>
+    <a:lvl8pPr marL="3200400" algn="l" defTabSz="914400" rtl="0" eaLnBrk="1" latinLnBrk="0" hangingPunct="1">
+      <a:defRPr sz="1200" kern="1200">
+        <a:solidFill>
+          <a:schemeClr val="tx1"/>
+        </a:solidFill>
+        <a:latin typeface="+mn-lt"/>
+        <a:ea typeface="+mn-ea"/>
+        <a:cs typeface="+mn-cs"/>
+      </a:defRPr>
+    </a:lvl8pPr>
+    <a:lvl9pPr marL="3657600" algn="l" defTabSz="914400" rtl="0" eaLnBrk="1" latinLnBrk="0" hangingPunct="1">
+      <a:defRPr sz="1200" kern="1200">
+        <a:solidFill>
+          <a:schemeClr val="tx1"/>
+        </a:solidFill>
+        <a:latin typeface="+mn-lt"/>
+        <a:ea typeface="+mn-ea"/>
+        <a:cs typeface="+mn-cs"/>
+      </a:defRPr>
+    </a:lvl9pPr>
+  </p:notesStyle>
+</p:notesMaster>
+</file>
+
+<file path=ppt/notesSlides/notesSlide1.xml><?xml version="1.0" encoding="utf-8"?>
+<p:notes xmlns:a="http://schemas.openxmlformats.org/drawingml/2006/main" xmlns:r="http://schemas.openxmlformats.org/officeDocument/2006/relationships" xmlns:p="http://schemas.openxmlformats.org/presentationml/2006/main">
+  <p:cSld>
+    <p:spTree>
+      <p:nvGrpSpPr>
+        <p:cNvPr id="1" name=""/>
+        <p:cNvGrpSpPr/>
+        <p:nvPr/>
+      </p:nvGrpSpPr>
+      <p:grpSpPr>
+        <a:xfrm>
+          <a:off x="0" y="0"/>
+          <a:ext cx="0" cy="0"/>
+          <a:chOff x="0" y="0"/>
+          <a:chExt cx="0" cy="0"/>
+        </a:xfrm>
+      </p:grpSpPr>
+      <p:sp>
+        <p:nvSpPr>
+          <p:cNvPr id="2" name="Slide Image Placeholder 1"/>
+          <p:cNvSpPr>
+            <a:spLocks noGrp="1" noRot="1" noChangeAspect="1"/>
+          </p:cNvSpPr>
+          <p:nvPr>
+            <p:ph type="sldImg"/>
+          </p:nvPr>
+        </p:nvSpPr>
+        <p:spPr/>
+      </p:sp>
+      <p:sp>
+        <p:nvSpPr>
+          <p:cNvPr id="3" name="Notes Placeholder 2"/>
+          <p:cNvSpPr>
+            <a:spLocks noGrp="1"/>
+          </p:cNvSpPr>
+          <p:nvPr>
+            <p:ph type="body" idx="1"/>
+          </p:nvPr>
+        </p:nvSpPr>
+        <p:spPr/>
+        <p:txBody>
+          <a:bodyPr/>
+          <a:lstStyle/>
+          <a:p>
+            <a:pPr marL="171450" indent="-171450">
+              <a:buFont typeface="Arial" panose="020B0604020202020204" pitchFamily="34" charset="0"/>
+              <a:buChar char="•"/>
+            </a:pPr>
+            <a:r>
+              <a:rPr lang="en-CH" dirty="0" err="1"/>
+              <a:t>Beschreibung</a:t>
+            </a:r>
+            <a:r>
+              <a:rPr lang="en-CH" dirty="0"/>
+              <a:t> der </a:t>
+            </a:r>
+            <a:r>
+              <a:rPr lang="en-CH" dirty="0" err="1"/>
+              <a:t>Methodik</a:t>
+            </a:r>
+            <a:r>
+              <a:rPr lang="en-CH" dirty="0"/>
+              <a:t> und </a:t>
+            </a:r>
+            <a:r>
+              <a:rPr lang="en-CH" dirty="0" err="1"/>
+              <a:t>Werkzeuge</a:t>
+            </a:r>
+            <a:r>
+              <a:rPr lang="en-CH" dirty="0"/>
+              <a:t> in </a:t>
+            </a:r>
+            <a:r>
+              <a:rPr lang="en-CH" dirty="0" err="1"/>
+              <a:t>unserer</a:t>
+            </a:r>
+            <a:r>
+              <a:rPr lang="en-CH" dirty="0"/>
+              <a:t> Challenge</a:t>
+            </a:r>
+          </a:p>
+          <a:p>
+            <a:pPr marL="171450" indent="-171450">
+              <a:buFont typeface="Arial" panose="020B0604020202020204" pitchFamily="34" charset="0"/>
+              <a:buChar char="•"/>
+            </a:pPr>
+            <a:r>
+              <a:rPr lang="en-CH" dirty="0" err="1"/>
+              <a:t>Theorie</a:t>
+            </a:r>
+            <a:r>
+              <a:rPr lang="en-CH" dirty="0"/>
+              <a:t> der </a:t>
+            </a:r>
+            <a:r>
+              <a:rPr lang="en-CH" dirty="0" err="1"/>
+              <a:t>Methoden</a:t>
+            </a:r>
+            <a:r>
+              <a:rPr lang="en-CH" dirty="0"/>
+              <a:t> und </a:t>
+            </a:r>
+            <a:r>
+              <a:rPr lang="en-CH" dirty="0" err="1"/>
+              <a:t>Werkzeuge</a:t>
+            </a:r>
+            <a:endParaRPr lang="de-CH" dirty="0"/>
+          </a:p>
+        </p:txBody>
+      </p:sp>
+      <p:sp>
+        <p:nvSpPr>
+          <p:cNvPr id="4" name="Slide Number Placeholder 3"/>
+          <p:cNvSpPr>
+            <a:spLocks noGrp="1"/>
+          </p:cNvSpPr>
+          <p:nvPr>
+            <p:ph type="sldNum" sz="quarter" idx="5"/>
+          </p:nvPr>
+        </p:nvSpPr>
+        <p:spPr/>
+        <p:txBody>
+          <a:bodyPr/>
+          <a:lstStyle/>
+          <a:p>
+            <a:fld id="{875D5C37-5F59-4FB3-BEF9-55AD76D26E10}" type="slidenum">
+              <a:rPr lang="de-CH" smtClean="0"/>
+              <a:t>1</a:t>
+            </a:fld>
+            <a:endParaRPr lang="de-CH"/>
+          </a:p>
+        </p:txBody>
+      </p:sp>
+    </p:spTree>
+    <p:extLst>
+      <p:ext uri="{BB962C8B-B14F-4D97-AF65-F5344CB8AC3E}">
+        <p14:creationId xmlns:p14="http://schemas.microsoft.com/office/powerpoint/2010/main" val="33725464"/>
+      </p:ext>
+    </p:extLst>
+  </p:cSld>
+  <p:clrMapOvr>
+    <a:masterClrMapping/>
+  </p:clrMapOvr>
+</p:notes>
+</file>
+
+<file path=ppt/notesSlides/notesSlide2.xml><?xml version="1.0" encoding="utf-8"?>
+<p:notes xmlns:a="http://schemas.openxmlformats.org/drawingml/2006/main" xmlns:r="http://schemas.openxmlformats.org/officeDocument/2006/relationships" xmlns:p="http://schemas.openxmlformats.org/presentationml/2006/main">
+  <p:cSld>
+    <p:spTree>
+      <p:nvGrpSpPr>
+        <p:cNvPr id="1" name=""/>
+        <p:cNvGrpSpPr/>
+        <p:nvPr/>
+      </p:nvGrpSpPr>
+      <p:grpSpPr>
+        <a:xfrm>
+          <a:off x="0" y="0"/>
+          <a:ext cx="0" cy="0"/>
+          <a:chOff x="0" y="0"/>
+          <a:chExt cx="0" cy="0"/>
+        </a:xfrm>
+      </p:grpSpPr>
+      <p:sp>
+        <p:nvSpPr>
+          <p:cNvPr id="2" name="Slide Image Placeholder 1"/>
+          <p:cNvSpPr>
+            <a:spLocks noGrp="1" noRot="1" noChangeAspect="1"/>
+          </p:cNvSpPr>
+          <p:nvPr>
+            <p:ph type="sldImg"/>
+          </p:nvPr>
+        </p:nvSpPr>
+        <p:spPr/>
+      </p:sp>
+      <p:sp>
+        <p:nvSpPr>
+          <p:cNvPr id="3" name="Notes Placeholder 2"/>
+          <p:cNvSpPr>
+            <a:spLocks noGrp="1"/>
+          </p:cNvSpPr>
+          <p:nvPr>
+            <p:ph type="body" idx="1"/>
+          </p:nvPr>
+        </p:nvSpPr>
+        <p:spPr/>
+        <p:txBody>
+          <a:bodyPr/>
+          <a:lstStyle/>
+          <a:p>
+            <a:pPr marL="171450" indent="-171450">
+              <a:buFont typeface="Arial" panose="020B0604020202020204" pitchFamily="34" charset="0"/>
+              <a:buChar char="•"/>
+            </a:pPr>
+            <a:r>
+              <a:rPr lang="en-CH" dirty="0" err="1"/>
+              <a:t>Realitätsabbildung</a:t>
+            </a:r>
+            <a:r>
+              <a:rPr lang="en-CH" dirty="0"/>
+              <a:t> </a:t>
+            </a:r>
+            <a:r>
+              <a:rPr lang="en-CH" dirty="0" err="1"/>
+              <a:t>durch</a:t>
+            </a:r>
+            <a:r>
+              <a:rPr lang="en-CH" dirty="0"/>
+              <a:t> </a:t>
+            </a:r>
+            <a:r>
+              <a:rPr lang="en-CH" dirty="0" err="1"/>
+              <a:t>physikalische</a:t>
+            </a:r>
+            <a:r>
+              <a:rPr lang="en-CH" dirty="0"/>
+              <a:t> </a:t>
+            </a:r>
+            <a:r>
+              <a:rPr lang="en-CH" dirty="0" err="1"/>
+              <a:t>Formeln</a:t>
+            </a:r>
+            <a:endParaRPr lang="en-CH" dirty="0"/>
+          </a:p>
+          <a:p>
+            <a:pPr marL="171450" indent="-171450">
+              <a:buFont typeface="Arial" panose="020B0604020202020204" pitchFamily="34" charset="0"/>
+              <a:buChar char="•"/>
+            </a:pPr>
+            <a:r>
+              <a:rPr lang="en-CH" dirty="0" err="1"/>
+              <a:t>Kinetische</a:t>
+            </a:r>
+            <a:r>
+              <a:rPr lang="en-CH" dirty="0"/>
+              <a:t> </a:t>
+            </a:r>
+            <a:r>
+              <a:rPr lang="en-CH" dirty="0" err="1"/>
+              <a:t>Energie</a:t>
+            </a:r>
+            <a:r>
+              <a:rPr lang="en-CH" dirty="0"/>
+              <a:t> </a:t>
+            </a:r>
+            <a:r>
+              <a:rPr lang="en-CH" dirty="0" err="1"/>
+              <a:t>eines</a:t>
+            </a:r>
+            <a:r>
+              <a:rPr lang="en-CH" dirty="0"/>
+              <a:t> Steins </a:t>
+            </a:r>
+            <a:r>
+              <a:rPr lang="en-CH" dirty="0" err="1"/>
+              <a:t>beim</a:t>
+            </a:r>
+            <a:r>
+              <a:rPr lang="en-CH" dirty="0"/>
+              <a:t> Fall</a:t>
+            </a:r>
+          </a:p>
+          <a:p>
+            <a:pPr marL="171450" marR="0" lvl="0" indent="-171450" algn="l" defTabSz="914400" rtl="0" eaLnBrk="1" fontAlgn="auto" latinLnBrk="0" hangingPunct="1">
+              <a:lnSpc>
+                <a:spcPct val="100000"/>
+              </a:lnSpc>
+              <a:spcBef>
+                <a:spcPts val="0"/>
+              </a:spcBef>
+              <a:spcAft>
+                <a:spcPts val="0"/>
+              </a:spcAft>
+              <a:buClrTx/>
+              <a:buSzTx/>
+              <a:buFont typeface="Arial" panose="020B0604020202020204" pitchFamily="34" charset="0"/>
+              <a:buChar char="•"/>
+              <a:tabLst/>
+              <a:defRPr/>
+            </a:pPr>
+            <a:r>
+              <a:rPr lang="de-CH" dirty="0"/>
+              <a:t>KE</a:t>
+            </a:r>
+            <a:r>
+              <a:rPr lang="en-CH" dirty="0"/>
+              <a:t> </a:t>
+            </a:r>
+            <a:r>
+              <a:rPr lang="de-CH" dirty="0"/>
+              <a:t>=</a:t>
+            </a:r>
+            <a:r>
+              <a:rPr lang="en-CH" dirty="0"/>
+              <a:t> </a:t>
+            </a:r>
+            <a:r>
+              <a:rPr lang="de-CH" dirty="0"/>
+              <a:t>1/2m</a:t>
+            </a:r>
+            <a:r>
+              <a:rPr lang="en-CH" dirty="0"/>
+              <a:t>*</a:t>
+            </a:r>
+            <a:r>
+              <a:rPr lang="de-CH" dirty="0"/>
+              <a:t>v^2</a:t>
+            </a:r>
+            <a:endParaRPr lang="en-CH" dirty="0"/>
+          </a:p>
+          <a:p>
+            <a:pPr marL="171450" indent="-171450">
+              <a:buFont typeface="Arial" panose="020B0604020202020204" pitchFamily="34" charset="0"/>
+              <a:buChar char="•"/>
+            </a:pPr>
+            <a:endParaRPr lang="en-CH" dirty="0"/>
+          </a:p>
+          <a:p>
+            <a:pPr marL="171450" indent="-171450">
+              <a:buFont typeface="Arial" panose="020B0604020202020204" pitchFamily="34" charset="0"/>
+              <a:buChar char="•"/>
+            </a:pPr>
+            <a:endParaRPr lang="de-CH" dirty="0"/>
+          </a:p>
+        </p:txBody>
+      </p:sp>
+      <p:sp>
+        <p:nvSpPr>
+          <p:cNvPr id="4" name="Slide Number Placeholder 3"/>
+          <p:cNvSpPr>
+            <a:spLocks noGrp="1"/>
+          </p:cNvSpPr>
+          <p:nvPr>
+            <p:ph type="sldNum" sz="quarter" idx="5"/>
+          </p:nvPr>
+        </p:nvSpPr>
+        <p:spPr/>
+        <p:txBody>
+          <a:bodyPr/>
+          <a:lstStyle/>
+          <a:p>
+            <a:fld id="{875D5C37-5F59-4FB3-BEF9-55AD76D26E10}" type="slidenum">
+              <a:rPr lang="de-CH" smtClean="0"/>
+              <a:t>2</a:t>
+            </a:fld>
+            <a:endParaRPr lang="de-CH"/>
+          </a:p>
+        </p:txBody>
+      </p:sp>
+    </p:spTree>
+    <p:extLst>
+      <p:ext uri="{BB962C8B-B14F-4D97-AF65-F5344CB8AC3E}">
+        <p14:creationId xmlns:p14="http://schemas.microsoft.com/office/powerpoint/2010/main" val="2782395760"/>
+      </p:ext>
+    </p:extLst>
+  </p:cSld>
+  <p:clrMapOvr>
+    <a:masterClrMapping/>
+  </p:clrMapOvr>
+</p:notes>
+</file>
+
+<file path=ppt/notesSlides/notesSlide3.xml><?xml version="1.0" encoding="utf-8"?>
+<p:notes xmlns:a="http://schemas.openxmlformats.org/drawingml/2006/main" xmlns:r="http://schemas.openxmlformats.org/officeDocument/2006/relationships" xmlns:p="http://schemas.openxmlformats.org/presentationml/2006/main">
+  <p:cSld>
+    <p:spTree>
+      <p:nvGrpSpPr>
+        <p:cNvPr id="1" name=""/>
+        <p:cNvGrpSpPr/>
+        <p:nvPr/>
+      </p:nvGrpSpPr>
+      <p:grpSpPr>
+        <a:xfrm>
+          <a:off x="0" y="0"/>
+          <a:ext cx="0" cy="0"/>
+          <a:chOff x="0" y="0"/>
+          <a:chExt cx="0" cy="0"/>
+        </a:xfrm>
+      </p:grpSpPr>
+      <p:sp>
+        <p:nvSpPr>
+          <p:cNvPr id="2" name="Slide Image Placeholder 1"/>
+          <p:cNvSpPr>
+            <a:spLocks noGrp="1" noRot="1" noChangeAspect="1"/>
+          </p:cNvSpPr>
+          <p:nvPr>
+            <p:ph type="sldImg"/>
+          </p:nvPr>
+        </p:nvSpPr>
+        <p:spPr/>
+      </p:sp>
+      <p:sp>
+        <p:nvSpPr>
+          <p:cNvPr id="3" name="Notes Placeholder 2"/>
+          <p:cNvSpPr>
+            <a:spLocks noGrp="1"/>
+          </p:cNvSpPr>
+          <p:nvPr>
+            <p:ph type="body" idx="1"/>
+          </p:nvPr>
+        </p:nvSpPr>
+        <p:spPr/>
+        <p:txBody>
+          <a:bodyPr/>
+          <a:lstStyle/>
+          <a:p>
+            <a:pPr marL="171450" indent="-171450">
+              <a:buFont typeface="Arial" panose="020B0604020202020204" pitchFamily="34" charset="0"/>
+              <a:buChar char="•"/>
+            </a:pPr>
+            <a:r>
+              <a:rPr lang="en-CH" dirty="0" err="1"/>
+              <a:t>Verteilungen</a:t>
+            </a:r>
+            <a:endParaRPr lang="en-CH" dirty="0"/>
+          </a:p>
+          <a:p>
+            <a:pPr marL="628650" lvl="1" indent="-171450">
+              <a:buFont typeface="Arial" panose="020B0604020202020204" pitchFamily="34" charset="0"/>
+              <a:buChar char="•"/>
+            </a:pPr>
+            <a:r>
+              <a:rPr lang="en-CH" dirty="0" err="1"/>
+              <a:t>Normalverteilung</a:t>
+            </a:r>
+            <a:r>
+              <a:rPr lang="en-CH" dirty="0"/>
+              <a:t> </a:t>
+            </a:r>
+            <a:r>
+              <a:rPr lang="en-CH" dirty="0" err="1"/>
+              <a:t>nach</a:t>
+            </a:r>
+            <a:r>
+              <a:rPr lang="en-CH" dirty="0"/>
+              <a:t> Gauss </a:t>
+            </a:r>
+            <a:r>
+              <a:rPr lang="en-CH" dirty="0" err="1"/>
+              <a:t>mit</a:t>
+            </a:r>
+            <a:r>
+              <a:rPr lang="en-CH" dirty="0"/>
+              <a:t> den</a:t>
+            </a:r>
+          </a:p>
+          <a:p>
+            <a:pPr marL="1085850" lvl="2" indent="-171450">
+              <a:buFont typeface="Arial" panose="020B0604020202020204" pitchFamily="34" charset="0"/>
+              <a:buChar char="•"/>
+            </a:pPr>
+            <a:r>
+              <a:rPr lang="en-CH" dirty="0"/>
+              <a:t>Parameter für </a:t>
+            </a:r>
+            <a:r>
+              <a:rPr lang="en-CH" dirty="0" err="1"/>
+              <a:t>Verteilung</a:t>
+            </a:r>
+            <a:r>
+              <a:rPr lang="en-CH" dirty="0"/>
+              <a:t> </a:t>
+            </a:r>
+            <a:r>
+              <a:rPr lang="en-CH" dirty="0" err="1"/>
+              <a:t>Standardabweichung</a:t>
+            </a:r>
+            <a:r>
+              <a:rPr lang="en-CH" dirty="0"/>
+              <a:t> und </a:t>
+            </a:r>
+            <a:r>
+              <a:rPr lang="en-CH" dirty="0" err="1"/>
+              <a:t>Mittelwert</a:t>
+            </a:r>
+            <a:r>
+              <a:rPr lang="en-CH" dirty="0"/>
+              <a:t> der </a:t>
+            </a:r>
+            <a:r>
+              <a:rPr lang="en-CH" dirty="0" err="1"/>
+              <a:t>Werte</a:t>
+            </a:r>
+            <a:r>
+              <a:rPr lang="en-CH" dirty="0"/>
+              <a:t>	</a:t>
+            </a:r>
+          </a:p>
+          <a:p>
+            <a:pPr marL="628650" lvl="1" indent="-171450">
+              <a:buFont typeface="Arial" panose="020B0604020202020204" pitchFamily="34" charset="0"/>
+              <a:buChar char="•"/>
+            </a:pPr>
+            <a:r>
+              <a:rPr lang="en-CH" dirty="0" err="1"/>
+              <a:t>Exponentialverteilung</a:t>
+            </a:r>
+            <a:r>
+              <a:rPr lang="en-CH" dirty="0"/>
+              <a:t> </a:t>
+            </a:r>
+          </a:p>
+          <a:p>
+            <a:pPr marL="1085850" lvl="2" indent="-171450">
+              <a:buFont typeface="Arial" panose="020B0604020202020204" pitchFamily="34" charset="0"/>
+              <a:buChar char="•"/>
+            </a:pPr>
+            <a:r>
+              <a:rPr lang="en-CH" dirty="0"/>
+              <a:t>Parameter </a:t>
+            </a:r>
+            <a:r>
+              <a:rPr lang="en-CH" dirty="0" err="1"/>
+              <a:t>Mittelwert</a:t>
+            </a:r>
+            <a:r>
+              <a:rPr lang="en-CH" dirty="0"/>
+              <a:t> </a:t>
+            </a:r>
+          </a:p>
+          <a:p>
+            <a:pPr marL="628650" lvl="1" indent="-171450">
+              <a:buFont typeface="Arial" panose="020B0604020202020204" pitchFamily="34" charset="0"/>
+              <a:buChar char="•"/>
+            </a:pPr>
+            <a:r>
+              <a:rPr lang="en-CH" dirty="0" err="1"/>
+              <a:t>Gammaverteilung</a:t>
+            </a:r>
+            <a:r>
+              <a:rPr lang="en-CH" dirty="0"/>
+              <a:t> , </a:t>
+            </a:r>
+            <a:r>
+              <a:rPr lang="en-CH" dirty="0" err="1"/>
+              <a:t>wie</a:t>
+            </a:r>
+            <a:r>
+              <a:rPr lang="en-CH" dirty="0"/>
+              <a:t> Exponential </a:t>
+            </a:r>
+            <a:r>
+              <a:rPr lang="en-CH" dirty="0" err="1"/>
+              <a:t>aber</a:t>
+            </a:r>
+            <a:r>
+              <a:rPr lang="en-CH" dirty="0"/>
+              <a:t> </a:t>
+            </a:r>
+            <a:r>
+              <a:rPr lang="en-CH" dirty="0" err="1"/>
+              <a:t>eine</a:t>
+            </a:r>
+            <a:r>
+              <a:rPr lang="en-CH" dirty="0"/>
+              <a:t> </a:t>
+            </a:r>
+            <a:r>
+              <a:rPr lang="en-CH" dirty="0" err="1"/>
+              <a:t>kleine</a:t>
+            </a:r>
+            <a:r>
+              <a:rPr lang="en-CH" dirty="0"/>
+              <a:t> </a:t>
+            </a:r>
+            <a:r>
+              <a:rPr lang="en-CH" dirty="0" err="1"/>
+              <a:t>Stauchung</a:t>
+            </a:r>
+            <a:r>
+              <a:rPr lang="en-CH" dirty="0"/>
+              <a:t>, </a:t>
+            </a:r>
+            <a:r>
+              <a:rPr lang="en-CH" dirty="0" err="1"/>
+              <a:t>fittete</a:t>
+            </a:r>
+            <a:r>
+              <a:rPr lang="en-CH" dirty="0"/>
+              <a:t> </a:t>
+            </a:r>
+            <a:r>
+              <a:rPr lang="en-CH" dirty="0" err="1"/>
+              <a:t>besser</a:t>
+            </a:r>
+            <a:r>
+              <a:rPr lang="en-CH" dirty="0"/>
+              <a:t> </a:t>
+            </a:r>
+            <a:r>
+              <a:rPr lang="en-CH" dirty="0" err="1"/>
+              <a:t>als</a:t>
+            </a:r>
+            <a:r>
+              <a:rPr lang="en-CH" dirty="0"/>
+              <a:t> exponential </a:t>
+            </a:r>
+            <a:r>
+              <a:rPr lang="en-CH" dirty="0" err="1"/>
+              <a:t>bei</a:t>
+            </a:r>
+            <a:r>
+              <a:rPr lang="en-CH" dirty="0"/>
+              <a:t> </a:t>
+            </a:r>
+            <a:r>
+              <a:rPr lang="en-CH" dirty="0" err="1"/>
+              <a:t>gewissen</a:t>
+            </a:r>
+            <a:r>
+              <a:rPr lang="en-CH" dirty="0"/>
+              <a:t> </a:t>
+            </a:r>
+            <a:r>
+              <a:rPr lang="en-CH" dirty="0" err="1"/>
+              <a:t>Spalten</a:t>
+            </a:r>
+            <a:endParaRPr lang="en-CH" dirty="0"/>
+          </a:p>
+          <a:p>
+            <a:pPr marL="1085850" lvl="2" indent="-171450">
+              <a:buFont typeface="Arial" panose="020B0604020202020204" pitchFamily="34" charset="0"/>
+              <a:buChar char="•"/>
+            </a:pPr>
+            <a:r>
+              <a:rPr lang="en-CH" dirty="0"/>
+              <a:t>Parameter </a:t>
+            </a:r>
+            <a:r>
+              <a:rPr lang="en-CH" dirty="0" err="1"/>
+              <a:t>Mittelwert</a:t>
+            </a:r>
+            <a:r>
+              <a:rPr lang="en-CH" dirty="0"/>
+              <a:t> </a:t>
+            </a:r>
+          </a:p>
+          <a:p>
+            <a:pPr marL="1085850" lvl="2" indent="-171450">
+              <a:buFont typeface="Arial" panose="020B0604020202020204" pitchFamily="34" charset="0"/>
+              <a:buChar char="•"/>
+            </a:pPr>
+            <a:endParaRPr lang="en-CH" dirty="0"/>
+          </a:p>
+        </p:txBody>
+      </p:sp>
+      <p:sp>
+        <p:nvSpPr>
+          <p:cNvPr id="4" name="Slide Number Placeholder 3"/>
+          <p:cNvSpPr>
+            <a:spLocks noGrp="1"/>
+          </p:cNvSpPr>
+          <p:nvPr>
+            <p:ph type="sldNum" sz="quarter" idx="5"/>
+          </p:nvPr>
+        </p:nvSpPr>
+        <p:spPr/>
+        <p:txBody>
+          <a:bodyPr/>
+          <a:lstStyle/>
+          <a:p>
+            <a:fld id="{875D5C37-5F59-4FB3-BEF9-55AD76D26E10}" type="slidenum">
+              <a:rPr lang="de-CH" smtClean="0"/>
+              <a:t>3</a:t>
+            </a:fld>
+            <a:endParaRPr lang="de-CH"/>
+          </a:p>
+        </p:txBody>
+      </p:sp>
+    </p:spTree>
+    <p:extLst>
+      <p:ext uri="{BB962C8B-B14F-4D97-AF65-F5344CB8AC3E}">
+        <p14:creationId xmlns:p14="http://schemas.microsoft.com/office/powerpoint/2010/main" val="3433852612"/>
+      </p:ext>
+    </p:extLst>
+  </p:cSld>
+  <p:clrMapOvr>
+    <a:masterClrMapping/>
+  </p:clrMapOvr>
+</p:notes>
+</file>
+
+<file path=ppt/notesSlides/notesSlide4.xml><?xml version="1.0" encoding="utf-8"?>
+<p:notes xmlns:a="http://schemas.openxmlformats.org/drawingml/2006/main" xmlns:r="http://schemas.openxmlformats.org/officeDocument/2006/relationships" xmlns:p="http://schemas.openxmlformats.org/presentationml/2006/main">
+  <p:cSld>
+    <p:spTree>
+      <p:nvGrpSpPr>
+        <p:cNvPr id="1" name=""/>
+        <p:cNvGrpSpPr/>
+        <p:nvPr/>
+      </p:nvGrpSpPr>
+      <p:grpSpPr>
+        <a:xfrm>
+          <a:off x="0" y="0"/>
+          <a:ext cx="0" cy="0"/>
+          <a:chOff x="0" y="0"/>
+          <a:chExt cx="0" cy="0"/>
+        </a:xfrm>
+      </p:grpSpPr>
+      <p:sp>
+        <p:nvSpPr>
+          <p:cNvPr id="2" name="Slide Image Placeholder 1"/>
+          <p:cNvSpPr>
+            <a:spLocks noGrp="1" noRot="1" noChangeAspect="1"/>
+          </p:cNvSpPr>
+          <p:nvPr>
+            <p:ph type="sldImg"/>
+          </p:nvPr>
+        </p:nvSpPr>
+        <p:spPr/>
+      </p:sp>
+      <p:sp>
+        <p:nvSpPr>
+          <p:cNvPr id="3" name="Notes Placeholder 2"/>
+          <p:cNvSpPr>
+            <a:spLocks noGrp="1"/>
+          </p:cNvSpPr>
+          <p:nvPr>
+            <p:ph type="body" idx="1"/>
+          </p:nvPr>
+        </p:nvSpPr>
+        <p:spPr/>
+        <p:txBody>
+          <a:bodyPr/>
+          <a:lstStyle/>
+          <a:p>
+            <a:pPr marL="171450" indent="-171450">
+              <a:buFont typeface="Arial" panose="020B0604020202020204" pitchFamily="34" charset="0"/>
+              <a:buChar char="•"/>
+            </a:pPr>
+            <a:r>
+              <a:rPr lang="en-CH" dirty="0" err="1"/>
+              <a:t>Erzeugung</a:t>
+            </a:r>
+            <a:r>
+              <a:rPr lang="en-CH" dirty="0"/>
+              <a:t> von </a:t>
+            </a:r>
+            <a:r>
+              <a:rPr lang="en-CH" dirty="0" err="1"/>
+              <a:t>neuen</a:t>
+            </a:r>
+            <a:r>
+              <a:rPr lang="en-CH" dirty="0"/>
+              <a:t> </a:t>
+            </a:r>
+            <a:r>
+              <a:rPr lang="en-CH" dirty="0" err="1"/>
+              <a:t>Werten</a:t>
+            </a:r>
+            <a:r>
+              <a:rPr lang="en-CH" dirty="0"/>
+              <a:t> der </a:t>
+            </a:r>
+            <a:r>
+              <a:rPr lang="en-CH" dirty="0" err="1"/>
+              <a:t>Spalten</a:t>
+            </a:r>
+            <a:endParaRPr lang="en-CH" dirty="0"/>
+          </a:p>
+          <a:p>
+            <a:pPr marL="171450" indent="-171450">
+              <a:buFont typeface="Arial" panose="020B0604020202020204" pitchFamily="34" charset="0"/>
+              <a:buChar char="•"/>
+            </a:pPr>
+            <a:r>
+              <a:rPr lang="de-CH" dirty="0"/>
+              <a:t>M</a:t>
+            </a:r>
+            <a:r>
+              <a:rPr lang="en-CH" dirty="0" err="1"/>
+              <a:t>ittels</a:t>
+            </a:r>
+            <a:r>
+              <a:rPr lang="en-CH" dirty="0"/>
+              <a:t> </a:t>
+            </a:r>
+            <a:r>
+              <a:rPr lang="en-CH" dirty="0" err="1"/>
+              <a:t>Verteilungsparameter</a:t>
+            </a:r>
+            <a:r>
+              <a:rPr lang="en-CH" dirty="0"/>
+              <a:t> und </a:t>
+            </a:r>
+            <a:r>
+              <a:rPr lang="en-CH" dirty="0" err="1"/>
+              <a:t>Verteilungen</a:t>
+            </a:r>
+            <a:r>
+              <a:rPr lang="en-CH" dirty="0"/>
+              <a:t> </a:t>
+            </a:r>
+          </a:p>
+          <a:p>
+            <a:pPr marL="171450" indent="-171450">
+              <a:buFont typeface="Arial" panose="020B0604020202020204" pitchFamily="34" charset="0"/>
+              <a:buChar char="•"/>
+            </a:pPr>
+            <a:endParaRPr lang="de-CH" dirty="0"/>
+          </a:p>
+        </p:txBody>
+      </p:sp>
+      <p:sp>
+        <p:nvSpPr>
+          <p:cNvPr id="4" name="Slide Number Placeholder 3"/>
+          <p:cNvSpPr>
+            <a:spLocks noGrp="1"/>
+          </p:cNvSpPr>
+          <p:nvPr>
+            <p:ph type="sldNum" sz="quarter" idx="5"/>
+          </p:nvPr>
+        </p:nvSpPr>
+        <p:spPr/>
+        <p:txBody>
+          <a:bodyPr/>
+          <a:lstStyle/>
+          <a:p>
+            <a:fld id="{875D5C37-5F59-4FB3-BEF9-55AD76D26E10}" type="slidenum">
+              <a:rPr lang="de-CH" smtClean="0"/>
+              <a:t>4</a:t>
+            </a:fld>
+            <a:endParaRPr lang="de-CH"/>
+          </a:p>
+        </p:txBody>
+      </p:sp>
+    </p:spTree>
+    <p:extLst>
+      <p:ext uri="{BB962C8B-B14F-4D97-AF65-F5344CB8AC3E}">
+        <p14:creationId xmlns:p14="http://schemas.microsoft.com/office/powerpoint/2010/main" val="1709411957"/>
+      </p:ext>
+    </p:extLst>
+  </p:cSld>
+  <p:clrMapOvr>
+    <a:masterClrMapping/>
+  </p:clrMapOvr>
+</p:notes>
+</file>
+
+<file path=ppt/notesSlides/notesSlide5.xml><?xml version="1.0" encoding="utf-8"?>
+<p:notes xmlns:a="http://schemas.openxmlformats.org/drawingml/2006/main" xmlns:r="http://schemas.openxmlformats.org/officeDocument/2006/relationships" xmlns:p="http://schemas.openxmlformats.org/presentationml/2006/main">
+  <p:cSld>
+    <p:spTree>
+      <p:nvGrpSpPr>
+        <p:cNvPr id="1" name=""/>
+        <p:cNvGrpSpPr/>
+        <p:nvPr/>
+      </p:nvGrpSpPr>
+      <p:grpSpPr>
+        <a:xfrm>
+          <a:off x="0" y="0"/>
+          <a:ext cx="0" cy="0"/>
+          <a:chOff x="0" y="0"/>
+          <a:chExt cx="0" cy="0"/>
+        </a:xfrm>
+      </p:grpSpPr>
+      <p:sp>
+        <p:nvSpPr>
+          <p:cNvPr id="2" name="Slide Image Placeholder 1"/>
+          <p:cNvSpPr>
+            <a:spLocks noGrp="1" noRot="1" noChangeAspect="1"/>
+          </p:cNvSpPr>
+          <p:nvPr>
+            <p:ph type="sldImg"/>
+          </p:nvPr>
+        </p:nvSpPr>
+        <p:spPr/>
+      </p:sp>
+      <p:sp>
+        <p:nvSpPr>
+          <p:cNvPr id="3" name="Notes Placeholder 2"/>
+          <p:cNvSpPr>
+            <a:spLocks noGrp="1"/>
+          </p:cNvSpPr>
+          <p:nvPr>
+            <p:ph type="body" idx="1"/>
+          </p:nvPr>
+        </p:nvSpPr>
+        <p:spPr/>
+        <p:txBody>
+          <a:bodyPr/>
+          <a:lstStyle/>
+          <a:p>
+            <a:pPr marL="171450" indent="-171450">
+              <a:buFont typeface="Arial" panose="020B0604020202020204" pitchFamily="34" charset="0"/>
+              <a:buChar char="•"/>
+            </a:pPr>
+            <a:r>
+              <a:rPr lang="de-CH" dirty="0"/>
+              <a:t>K</a:t>
+            </a:r>
+            <a:r>
+              <a:rPr lang="en-CH" dirty="0" err="1"/>
+              <a:t>ausale</a:t>
+            </a:r>
+            <a:r>
+              <a:rPr lang="en-CH" dirty="0"/>
+              <a:t> </a:t>
+            </a:r>
+            <a:r>
+              <a:rPr lang="en-CH" dirty="0" err="1"/>
+              <a:t>Ereigniskette</a:t>
+            </a:r>
+            <a:r>
+              <a:rPr lang="en-CH" dirty="0"/>
+              <a:t> </a:t>
+            </a:r>
+          </a:p>
+          <a:p>
+            <a:pPr marL="628650" lvl="1" indent="-171450">
+              <a:buFont typeface="Arial" panose="020B0604020202020204" pitchFamily="34" charset="0"/>
+              <a:buChar char="•"/>
+            </a:pPr>
+            <a:r>
+              <a:rPr lang="en-CH" dirty="0" err="1"/>
+              <a:t>Eintreffen</a:t>
+            </a:r>
+            <a:r>
+              <a:rPr lang="en-CH" dirty="0"/>
+              <a:t> von </a:t>
+            </a:r>
+            <a:r>
+              <a:rPr lang="en-CH" dirty="0" err="1"/>
+              <a:t>Ereignissen</a:t>
+            </a:r>
+            <a:r>
+              <a:rPr lang="en-CH" dirty="0"/>
+              <a:t> in </a:t>
+            </a:r>
+            <a:r>
+              <a:rPr lang="en-CH" dirty="0" err="1"/>
+              <a:t>einer</a:t>
+            </a:r>
+            <a:r>
+              <a:rPr lang="en-CH" dirty="0"/>
+              <a:t> </a:t>
+            </a:r>
+            <a:r>
+              <a:rPr lang="en-CH" dirty="0" err="1"/>
+              <a:t>Kette</a:t>
+            </a:r>
+            <a:r>
+              <a:rPr lang="en-CH" dirty="0"/>
+              <a:t> </a:t>
+            </a:r>
+            <a:r>
+              <a:rPr lang="en-CH" dirty="0" err="1"/>
+              <a:t>verlinkt</a:t>
+            </a:r>
+            <a:endParaRPr lang="en-CH" dirty="0"/>
+          </a:p>
+          <a:p>
+            <a:pPr marL="628650" lvl="1" indent="-171450">
+              <a:buFont typeface="Arial" panose="020B0604020202020204" pitchFamily="34" charset="0"/>
+              <a:buChar char="•"/>
+            </a:pPr>
+            <a:r>
+              <a:rPr lang="en-CH" dirty="0" err="1"/>
+              <a:t>Wahrscheinlichkeit</a:t>
+            </a:r>
+            <a:r>
+              <a:rPr lang="en-CH" dirty="0"/>
+              <a:t> des </a:t>
+            </a:r>
+            <a:r>
+              <a:rPr lang="en-CH" dirty="0" err="1"/>
+              <a:t>Eintreffens</a:t>
+            </a:r>
+            <a:r>
+              <a:rPr lang="en-CH" dirty="0"/>
+              <a:t> der </a:t>
+            </a:r>
+            <a:r>
+              <a:rPr lang="en-CH" dirty="0" err="1"/>
+              <a:t>Ereignisse</a:t>
+            </a:r>
+            <a:r>
+              <a:rPr lang="en-CH" dirty="0"/>
+              <a:t> </a:t>
+            </a:r>
+            <a:r>
+              <a:rPr lang="en-CH" dirty="0" err="1"/>
+              <a:t>errechnet</a:t>
+            </a:r>
+            <a:endParaRPr lang="de-CH" dirty="0"/>
+          </a:p>
+        </p:txBody>
+      </p:sp>
+      <p:sp>
+        <p:nvSpPr>
+          <p:cNvPr id="4" name="Slide Number Placeholder 3"/>
+          <p:cNvSpPr>
+            <a:spLocks noGrp="1"/>
+          </p:cNvSpPr>
+          <p:nvPr>
+            <p:ph type="sldNum" sz="quarter" idx="5"/>
+          </p:nvPr>
+        </p:nvSpPr>
+        <p:spPr/>
+        <p:txBody>
+          <a:bodyPr/>
+          <a:lstStyle/>
+          <a:p>
+            <a:fld id="{875D5C37-5F59-4FB3-BEF9-55AD76D26E10}" type="slidenum">
+              <a:rPr lang="de-CH" smtClean="0"/>
+              <a:t>5</a:t>
+            </a:fld>
+            <a:endParaRPr lang="de-CH"/>
+          </a:p>
+        </p:txBody>
+      </p:sp>
+    </p:spTree>
+    <p:extLst>
+      <p:ext uri="{BB962C8B-B14F-4D97-AF65-F5344CB8AC3E}">
+        <p14:creationId xmlns:p14="http://schemas.microsoft.com/office/powerpoint/2010/main" val="2436170313"/>
+      </p:ext>
+    </p:extLst>
+  </p:cSld>
+  <p:clrMapOvr>
+    <a:masterClrMapping/>
+  </p:clrMapOvr>
+</p:notes>
+</file>
+
+<file path=ppt/notesSlides/notesSlide6.xml><?xml version="1.0" encoding="utf-8"?>
+<p:notes xmlns:a="http://schemas.openxmlformats.org/drawingml/2006/main" xmlns:r="http://schemas.openxmlformats.org/officeDocument/2006/relationships" xmlns:p="http://schemas.openxmlformats.org/presentationml/2006/main">
+  <p:cSld>
+    <p:spTree>
+      <p:nvGrpSpPr>
+        <p:cNvPr id="1" name=""/>
+        <p:cNvGrpSpPr/>
+        <p:nvPr/>
+      </p:nvGrpSpPr>
+      <p:grpSpPr>
+        <a:xfrm>
+          <a:off x="0" y="0"/>
+          <a:ext cx="0" cy="0"/>
+          <a:chOff x="0" y="0"/>
+          <a:chExt cx="0" cy="0"/>
+        </a:xfrm>
+      </p:grpSpPr>
+      <p:sp>
+        <p:nvSpPr>
+          <p:cNvPr id="2" name="Slide Image Placeholder 1"/>
+          <p:cNvSpPr>
+            <a:spLocks noGrp="1" noRot="1" noChangeAspect="1"/>
+          </p:cNvSpPr>
+          <p:nvPr>
+            <p:ph type="sldImg"/>
+          </p:nvPr>
+        </p:nvSpPr>
+        <p:spPr/>
+      </p:sp>
+      <p:sp>
+        <p:nvSpPr>
+          <p:cNvPr id="3" name="Notes Placeholder 2"/>
+          <p:cNvSpPr>
+            <a:spLocks noGrp="1"/>
+          </p:cNvSpPr>
+          <p:nvPr>
+            <p:ph type="body" idx="1"/>
+          </p:nvPr>
+        </p:nvSpPr>
+        <p:spPr/>
+        <p:txBody>
+          <a:bodyPr/>
+          <a:lstStyle/>
+          <a:p>
+            <a:pPr marL="171450" indent="-171450">
+              <a:buFont typeface="Arial" panose="020B0604020202020204" pitchFamily="34" charset="0"/>
+              <a:buChar char="•"/>
+            </a:pPr>
+            <a:r>
+              <a:rPr lang="en-CH" dirty="0" err="1"/>
+              <a:t>Verwendung</a:t>
+            </a:r>
+            <a:r>
+              <a:rPr lang="en-CH" dirty="0"/>
+              <a:t> von Python </a:t>
+            </a:r>
+            <a:r>
+              <a:rPr lang="en-CH" dirty="0" err="1"/>
+              <a:t>als</a:t>
+            </a:r>
+            <a:r>
+              <a:rPr lang="en-CH" dirty="0"/>
+              <a:t> </a:t>
+            </a:r>
+            <a:r>
+              <a:rPr lang="en-CH" dirty="0" err="1"/>
+              <a:t>Hauptsprache</a:t>
+            </a:r>
+            <a:endParaRPr lang="en-CH" dirty="0"/>
+          </a:p>
+          <a:p>
+            <a:pPr marL="628650" lvl="1" indent="-171450">
+              <a:buFont typeface="Arial" panose="020B0604020202020204" pitchFamily="34" charset="0"/>
+              <a:buChar char="•"/>
+            </a:pPr>
+            <a:r>
+              <a:rPr lang="en-CH" dirty="0"/>
+              <a:t>Pandas</a:t>
+            </a:r>
+          </a:p>
+          <a:p>
+            <a:pPr marL="1085850" lvl="2" indent="-171450">
+              <a:buFont typeface="Arial" panose="020B0604020202020204" pitchFamily="34" charset="0"/>
+              <a:buChar char="•"/>
+            </a:pPr>
+            <a:r>
+              <a:rPr lang="en-CH" dirty="0" err="1"/>
+              <a:t>Lesen</a:t>
+            </a:r>
+            <a:r>
+              <a:rPr lang="en-CH" dirty="0"/>
+              <a:t>, </a:t>
+            </a:r>
+            <a:r>
+              <a:rPr lang="en-CH" dirty="0" err="1"/>
+              <a:t>Bearbeiten</a:t>
+            </a:r>
+            <a:r>
+              <a:rPr lang="en-CH" dirty="0"/>
+              <a:t> und </a:t>
+            </a:r>
+            <a:r>
+              <a:rPr lang="en-CH" dirty="0" err="1"/>
+              <a:t>Ergänzen</a:t>
+            </a:r>
+            <a:r>
+              <a:rPr lang="en-CH" dirty="0"/>
+              <a:t> von </a:t>
+            </a:r>
+            <a:r>
+              <a:rPr lang="en-CH" dirty="0" err="1"/>
+              <a:t>Daten</a:t>
+            </a:r>
+            <a:endParaRPr lang="en-CH" dirty="0"/>
+          </a:p>
+          <a:p>
+            <a:pPr marL="1085850" lvl="2" indent="-171450">
+              <a:buFont typeface="Arial" panose="020B0604020202020204" pitchFamily="34" charset="0"/>
+              <a:buChar char="•"/>
+            </a:pPr>
+            <a:r>
+              <a:rPr lang="en-CH" dirty="0" err="1"/>
+              <a:t>Einfach</a:t>
+            </a:r>
+            <a:r>
+              <a:rPr lang="en-CH" dirty="0"/>
+              <a:t> </a:t>
+            </a:r>
+            <a:r>
+              <a:rPr lang="en-CH" dirty="0" err="1"/>
+              <a:t>anzuwenden</a:t>
+            </a:r>
+            <a:r>
+              <a:rPr lang="en-CH" dirty="0"/>
+              <a:t> und </a:t>
+            </a:r>
+            <a:r>
+              <a:rPr lang="en-CH" dirty="0" err="1"/>
+              <a:t>weitverbreitet</a:t>
+            </a:r>
+            <a:endParaRPr lang="en-CH" dirty="0"/>
+          </a:p>
+          <a:p>
+            <a:pPr marL="628650" lvl="1" indent="-171450">
+              <a:buFont typeface="Arial" panose="020B0604020202020204" pitchFamily="34" charset="0"/>
+              <a:buChar char="•"/>
+            </a:pPr>
+            <a:r>
+              <a:rPr lang="en-CH" dirty="0" err="1"/>
+              <a:t>Numpy</a:t>
+            </a:r>
+            <a:endParaRPr lang="en-CH" dirty="0"/>
+          </a:p>
+          <a:p>
+            <a:pPr marL="1085850" lvl="2" indent="-171450">
+              <a:buFont typeface="Arial" panose="020B0604020202020204" pitchFamily="34" charset="0"/>
+              <a:buChar char="•"/>
+            </a:pPr>
+            <a:r>
+              <a:rPr lang="en-CH" dirty="0" err="1"/>
+              <a:t>Ergänzungensfunktionen</a:t>
+            </a:r>
+            <a:r>
+              <a:rPr lang="en-CH" dirty="0"/>
+              <a:t> </a:t>
+            </a:r>
+            <a:r>
+              <a:rPr lang="en-CH" dirty="0" err="1"/>
+              <a:t>zu</a:t>
+            </a:r>
+            <a:r>
+              <a:rPr lang="en-CH" dirty="0"/>
+              <a:t> pandas (</a:t>
+            </a:r>
+            <a:r>
+              <a:rPr lang="en-CH" dirty="0" err="1"/>
+              <a:t>Selektion</a:t>
+            </a:r>
+            <a:r>
+              <a:rPr lang="en-CH" dirty="0"/>
+              <a:t> von </a:t>
+            </a:r>
+            <a:r>
+              <a:rPr lang="en-CH" dirty="0" err="1"/>
+              <a:t>daten</a:t>
+            </a:r>
+            <a:r>
+              <a:rPr lang="en-CH" dirty="0"/>
+              <a:t> (where))</a:t>
+            </a:r>
+          </a:p>
+          <a:p>
+            <a:pPr marL="1085850" lvl="2" indent="-171450">
+              <a:buFont typeface="Arial" panose="020B0604020202020204" pitchFamily="34" charset="0"/>
+              <a:buChar char="•"/>
+            </a:pPr>
+            <a:r>
+              <a:rPr lang="en-CH" dirty="0" err="1"/>
+              <a:t>Bestimmen</a:t>
+            </a:r>
+            <a:r>
+              <a:rPr lang="en-CH" dirty="0"/>
+              <a:t> von </a:t>
+            </a:r>
+            <a:r>
+              <a:rPr lang="en-CH" dirty="0" err="1"/>
+              <a:t>Verteilungsparametern</a:t>
+            </a:r>
+            <a:r>
+              <a:rPr lang="en-CH" dirty="0"/>
+              <a:t> </a:t>
+            </a:r>
+            <a:r>
+              <a:rPr lang="en-CH" dirty="0" err="1"/>
+              <a:t>wie</a:t>
+            </a:r>
+            <a:r>
+              <a:rPr lang="en-CH" dirty="0"/>
+              <a:t> std, </a:t>
+            </a:r>
+            <a:r>
+              <a:rPr lang="en-CH" dirty="0" err="1"/>
+              <a:t>mittelwert</a:t>
+            </a:r>
+            <a:endParaRPr lang="en-CH" dirty="0"/>
+          </a:p>
+          <a:p>
+            <a:pPr marL="1085850" lvl="2" indent="-171450">
+              <a:buFont typeface="Arial" panose="020B0604020202020204" pitchFamily="34" charset="0"/>
+              <a:buChar char="•"/>
+            </a:pPr>
+            <a:r>
+              <a:rPr lang="en-CH" dirty="0" err="1"/>
+              <a:t>Generieren</a:t>
+            </a:r>
+            <a:r>
+              <a:rPr lang="en-CH" dirty="0"/>
+              <a:t> von </a:t>
+            </a:r>
+            <a:r>
+              <a:rPr lang="en-CH" dirty="0" err="1"/>
+              <a:t>simulationswerten</a:t>
+            </a:r>
+            <a:r>
+              <a:rPr lang="en-CH" dirty="0"/>
+              <a:t> ( generator )</a:t>
+            </a:r>
+          </a:p>
+          <a:p>
+            <a:pPr marL="628650" lvl="1" indent="-171450">
+              <a:buFont typeface="Arial" panose="020B0604020202020204" pitchFamily="34" charset="0"/>
+              <a:buChar char="•"/>
+            </a:pPr>
+            <a:r>
+              <a:rPr lang="en-CH" dirty="0" err="1"/>
+              <a:t>Scipy</a:t>
+            </a:r>
+            <a:endParaRPr lang="en-CH" dirty="0"/>
+          </a:p>
+          <a:p>
+            <a:pPr marL="1085850" lvl="2" indent="-171450">
+              <a:buFont typeface="Arial" panose="020B0604020202020204" pitchFamily="34" charset="0"/>
+              <a:buChar char="•"/>
+            </a:pPr>
+            <a:r>
+              <a:rPr lang="en-CH" dirty="0"/>
+              <a:t>KS Test um die </a:t>
+            </a:r>
+            <a:r>
+              <a:rPr lang="en-CH" dirty="0" err="1"/>
+              <a:t>Verteilungfamile</a:t>
+            </a:r>
+            <a:r>
+              <a:rPr lang="en-CH" dirty="0"/>
+              <a:t> </a:t>
+            </a:r>
+            <a:r>
+              <a:rPr lang="en-CH" dirty="0" err="1"/>
+              <a:t>zu</a:t>
+            </a:r>
+            <a:r>
+              <a:rPr lang="en-CH" dirty="0"/>
+              <a:t> </a:t>
+            </a:r>
+            <a:r>
+              <a:rPr lang="en-CH" dirty="0" err="1"/>
+              <a:t>eruieren</a:t>
+            </a:r>
+            <a:endParaRPr lang="en-CH" dirty="0"/>
+          </a:p>
+          <a:p>
+            <a:pPr marL="628650" lvl="1" indent="-171450">
+              <a:buFont typeface="Arial" panose="020B0604020202020204" pitchFamily="34" charset="0"/>
+              <a:buChar char="•"/>
+            </a:pPr>
+            <a:r>
+              <a:rPr lang="en-CH" dirty="0"/>
+              <a:t>Matplotlib</a:t>
+            </a:r>
+          </a:p>
+          <a:p>
+            <a:pPr marL="1085850" lvl="2" indent="-171450">
+              <a:buFont typeface="Arial" panose="020B0604020202020204" pitchFamily="34" charset="0"/>
+              <a:buChar char="•"/>
+            </a:pPr>
+            <a:r>
+              <a:rPr lang="de-CH" dirty="0"/>
+              <a:t>E</a:t>
+            </a:r>
+            <a:r>
+              <a:rPr lang="en-CH" dirty="0" err="1"/>
+              <a:t>xplorative</a:t>
+            </a:r>
+            <a:r>
+              <a:rPr lang="en-CH" dirty="0"/>
+              <a:t> </a:t>
+            </a:r>
+            <a:r>
+              <a:rPr lang="en-CH" dirty="0" err="1"/>
+              <a:t>Datenanalyse</a:t>
+            </a:r>
+            <a:endParaRPr lang="en-CH" dirty="0"/>
+          </a:p>
+          <a:p>
+            <a:pPr marL="1085850" lvl="2" indent="-171450">
+              <a:buFont typeface="Arial" panose="020B0604020202020204" pitchFamily="34" charset="0"/>
+              <a:buChar char="•"/>
+            </a:pPr>
+            <a:r>
+              <a:rPr lang="en-CH" dirty="0" err="1"/>
+              <a:t>Plotten</a:t>
+            </a:r>
+            <a:r>
+              <a:rPr lang="en-CH" dirty="0"/>
+              <a:t> von </a:t>
+            </a:r>
+            <a:r>
+              <a:rPr lang="en-CH" dirty="0" err="1"/>
+              <a:t>Verteilungen</a:t>
+            </a:r>
+            <a:r>
+              <a:rPr lang="en-CH" dirty="0"/>
+              <a:t> </a:t>
+            </a:r>
+            <a:r>
+              <a:rPr lang="en-CH" dirty="0" err="1"/>
+              <a:t>zur</a:t>
+            </a:r>
+            <a:r>
+              <a:rPr lang="en-CH" dirty="0"/>
+              <a:t> </a:t>
+            </a:r>
+            <a:r>
+              <a:rPr lang="en-CH" dirty="0" err="1"/>
+              <a:t>visuellen</a:t>
+            </a:r>
+            <a:r>
+              <a:rPr lang="en-CH" dirty="0"/>
+              <a:t> </a:t>
+            </a:r>
+            <a:r>
+              <a:rPr lang="en-CH" dirty="0" err="1"/>
+              <a:t>Kontrolle</a:t>
+            </a:r>
+            <a:r>
+              <a:rPr lang="en-CH" dirty="0"/>
+              <a:t> des KS Tests</a:t>
+            </a:r>
+          </a:p>
+          <a:p>
+            <a:pPr marL="1085850" lvl="2" indent="-171450">
+              <a:buFont typeface="Arial" panose="020B0604020202020204" pitchFamily="34" charset="0"/>
+              <a:buChar char="•"/>
+            </a:pPr>
+            <a:r>
+              <a:rPr lang="en-CH" dirty="0" err="1"/>
+              <a:t>Plotten</a:t>
+            </a:r>
+            <a:r>
+              <a:rPr lang="en-CH" dirty="0"/>
+              <a:t> </a:t>
+            </a:r>
+            <a:r>
+              <a:rPr lang="en-CH" dirty="0" err="1"/>
+              <a:t>zur</a:t>
+            </a:r>
+            <a:r>
+              <a:rPr lang="en-CH" dirty="0"/>
+              <a:t> </a:t>
+            </a:r>
+            <a:r>
+              <a:rPr lang="en-CH" dirty="0" err="1"/>
+              <a:t>Visualisierung</a:t>
+            </a:r>
+            <a:r>
+              <a:rPr lang="en-CH" dirty="0"/>
+              <a:t> von </a:t>
+            </a:r>
+            <a:r>
+              <a:rPr lang="en-CH" dirty="0" err="1"/>
+              <a:t>Ausreissern</a:t>
+            </a:r>
+            <a:r>
+              <a:rPr lang="en-CH" dirty="0"/>
+              <a:t> </a:t>
+            </a:r>
+          </a:p>
+          <a:p>
+            <a:pPr marL="1085850" lvl="2" indent="-171450">
+              <a:buFont typeface="Arial" panose="020B0604020202020204" pitchFamily="34" charset="0"/>
+              <a:buChar char="•"/>
+            </a:pPr>
+            <a:endParaRPr lang="en-CH" dirty="0"/>
+          </a:p>
+        </p:txBody>
+      </p:sp>
+      <p:sp>
+        <p:nvSpPr>
+          <p:cNvPr id="4" name="Slide Number Placeholder 3"/>
+          <p:cNvSpPr>
+            <a:spLocks noGrp="1"/>
+          </p:cNvSpPr>
+          <p:nvPr>
+            <p:ph type="sldNum" sz="quarter" idx="5"/>
+          </p:nvPr>
+        </p:nvSpPr>
+        <p:spPr/>
+        <p:txBody>
+          <a:bodyPr/>
+          <a:lstStyle/>
+          <a:p>
+            <a:fld id="{875D5C37-5F59-4FB3-BEF9-55AD76D26E10}" type="slidenum">
+              <a:rPr lang="de-CH" smtClean="0"/>
+              <a:t>6</a:t>
+            </a:fld>
+            <a:endParaRPr lang="de-CH"/>
+          </a:p>
+        </p:txBody>
+      </p:sp>
+    </p:spTree>
+    <p:extLst>
+      <p:ext uri="{BB962C8B-B14F-4D97-AF65-F5344CB8AC3E}">
+        <p14:creationId xmlns:p14="http://schemas.microsoft.com/office/powerpoint/2010/main" val="1562838552"/>
+      </p:ext>
+    </p:extLst>
+  </p:cSld>
+  <p:clrMapOvr>
+    <a:masterClrMapping/>
+  </p:clrMapOvr>
+</p:notes>
 </file>
 
 <file path=ppt/slideLayouts/slideLayout1.xml><?xml version="1.0" encoding="utf-8"?>
@@ -359,7 +2359,7 @@
           <a:p>
             <a:fld id="{95C481CA-A6AA-4E4C-AC74-668A4952B1F1}" type="datetimeFigureOut">
               <a:rPr lang="de-CH" smtClean="0"/>
-              <a:t>08.01.2022</a:t>
+              <a:t>19.01.2022</a:t>
             </a:fld>
             <a:endParaRPr lang="de-CH"/>
           </a:p>
@@ -559,7 +2559,7 @@
           <a:p>
             <a:fld id="{95C481CA-A6AA-4E4C-AC74-668A4952B1F1}" type="datetimeFigureOut">
               <a:rPr lang="de-CH" smtClean="0"/>
-              <a:t>08.01.2022</a:t>
+              <a:t>19.01.2022</a:t>
             </a:fld>
             <a:endParaRPr lang="de-CH"/>
           </a:p>
@@ -769,7 +2769,7 @@
           <a:p>
             <a:fld id="{95C481CA-A6AA-4E4C-AC74-668A4952B1F1}" type="datetimeFigureOut">
               <a:rPr lang="de-CH" smtClean="0"/>
-              <a:t>08.01.2022</a:t>
+              <a:t>19.01.2022</a:t>
             </a:fld>
             <a:endParaRPr lang="de-CH"/>
           </a:p>
@@ -969,7 +2969,7 @@
           <a:p>
             <a:fld id="{95C481CA-A6AA-4E4C-AC74-668A4952B1F1}" type="datetimeFigureOut">
               <a:rPr lang="de-CH" smtClean="0"/>
-              <a:t>08.01.2022</a:t>
+              <a:t>19.01.2022</a:t>
             </a:fld>
             <a:endParaRPr lang="de-CH"/>
           </a:p>
@@ -1245,7 +3245,7 @@
           <a:p>
             <a:fld id="{95C481CA-A6AA-4E4C-AC74-668A4952B1F1}" type="datetimeFigureOut">
               <a:rPr lang="de-CH" smtClean="0"/>
-              <a:t>08.01.2022</a:t>
+              <a:t>19.01.2022</a:t>
             </a:fld>
             <a:endParaRPr lang="de-CH"/>
           </a:p>
@@ -1513,7 +3513,7 @@
           <a:p>
             <a:fld id="{95C481CA-A6AA-4E4C-AC74-668A4952B1F1}" type="datetimeFigureOut">
               <a:rPr lang="de-CH" smtClean="0"/>
-              <a:t>08.01.2022</a:t>
+              <a:t>19.01.2022</a:t>
             </a:fld>
             <a:endParaRPr lang="de-CH"/>
           </a:p>
@@ -1928,7 +3928,7 @@
           <a:p>
             <a:fld id="{95C481CA-A6AA-4E4C-AC74-668A4952B1F1}" type="datetimeFigureOut">
               <a:rPr lang="de-CH" smtClean="0"/>
-              <a:t>08.01.2022</a:t>
+              <a:t>19.01.2022</a:t>
             </a:fld>
             <a:endParaRPr lang="de-CH"/>
           </a:p>
@@ -2070,7 +4070,7 @@
           <a:p>
             <a:fld id="{95C481CA-A6AA-4E4C-AC74-668A4952B1F1}" type="datetimeFigureOut">
               <a:rPr lang="de-CH" smtClean="0"/>
-              <a:t>08.01.2022</a:t>
+              <a:t>19.01.2022</a:t>
             </a:fld>
             <a:endParaRPr lang="de-CH"/>
           </a:p>
@@ -2183,7 +4183,7 @@
           <a:p>
             <a:fld id="{95C481CA-A6AA-4E4C-AC74-668A4952B1F1}" type="datetimeFigureOut">
               <a:rPr lang="de-CH" smtClean="0"/>
-              <a:t>08.01.2022</a:t>
+              <a:t>19.01.2022</a:t>
             </a:fld>
             <a:endParaRPr lang="de-CH"/>
           </a:p>
@@ -2496,7 +4496,7 @@
           <a:p>
             <a:fld id="{95C481CA-A6AA-4E4C-AC74-668A4952B1F1}" type="datetimeFigureOut">
               <a:rPr lang="de-CH" smtClean="0"/>
-              <a:t>08.01.2022</a:t>
+              <a:t>19.01.2022</a:t>
             </a:fld>
             <a:endParaRPr lang="de-CH"/>
           </a:p>
@@ -2785,7 +4785,7 @@
           <a:p>
             <a:fld id="{95C481CA-A6AA-4E4C-AC74-668A4952B1F1}" type="datetimeFigureOut">
               <a:rPr lang="de-CH" smtClean="0"/>
-              <a:t>08.01.2022</a:t>
+              <a:t>19.01.2022</a:t>
             </a:fld>
             <a:endParaRPr lang="de-CH"/>
           </a:p>
@@ -3028,7 +5028,7 @@
           <a:p>
             <a:fld id="{95C481CA-A6AA-4E4C-AC74-668A4952B1F1}" type="datetimeFigureOut">
               <a:rPr lang="de-CH" smtClean="0"/>
-              <a:t>08.01.2022</a:t>
+              <a:t>19.01.2022</a:t>
             </a:fld>
             <a:endParaRPr lang="de-CH"/>
           </a:p>
@@ -3542,7 +5542,7 @@
           <p:cNvPr id="2" name="Title 1">
             <a:extLst>
               <a:ext uri="{FF2B5EF4-FFF2-40B4-BE49-F238E27FC236}">
-                <a16:creationId xmlns:a16="http://schemas.microsoft.com/office/drawing/2014/main" id="{17A790C2-2DD6-483E-B387-6989EF760951}"/>
+                <a16:creationId xmlns:a16="http://schemas.microsoft.com/office/drawing/2014/main" id="{9B2E639B-1879-4C21-B581-9CA021F14725}"/>
               </a:ext>
             </a:extLst>
           </p:cNvPr>
@@ -3559,8 +5559,16 @@
           <a:lstStyle/>
           <a:p>
             <a:r>
-              <a:rPr lang="en-CH" dirty="0"/>
-              <a:t>Python</a:t>
+              <a:rPr lang="en-CH" dirty="0" err="1"/>
+              <a:t>Physikalische</a:t>
+            </a:r>
+            <a:r>
+              <a:rPr lang="en-CH" dirty="0"/>
+              <a:t> </a:t>
+            </a:r>
+            <a:r>
+              <a:rPr lang="en-CH" dirty="0" err="1"/>
+              <a:t>Formeln</a:t>
             </a:r>
             <a:endParaRPr lang="de-CH" dirty="0"/>
           </a:p>
@@ -3571,7 +5579,7 @@
           <p:cNvPr id="3" name="Content Placeholder 2">
             <a:extLst>
               <a:ext uri="{FF2B5EF4-FFF2-40B4-BE49-F238E27FC236}">
-                <a16:creationId xmlns:a16="http://schemas.microsoft.com/office/drawing/2014/main" id="{12678806-2259-4CF4-9E4A-27E0FDDBCD3C}"/>
+                <a16:creationId xmlns:a16="http://schemas.microsoft.com/office/drawing/2014/main" id="{81E25CF7-F6AE-4E1A-AAFA-15BE43C99247}"/>
               </a:ext>
             </a:extLst>
           </p:cNvPr>
@@ -3584,221 +5592,80 @@
         </p:nvSpPr>
         <p:spPr/>
         <p:txBody>
-          <a:bodyPr>
-            <a:normAutofit fontScale="92500" lnSpcReduction="20000"/>
-          </a:bodyPr>
+          <a:bodyPr/>
           <a:lstStyle/>
           <a:p>
             <a:r>
-              <a:rPr lang="de-CH" dirty="0"/>
-              <a:t>P</a:t>
-            </a:r>
-            <a:r>
-              <a:rPr lang="en-CH" dirty="0" err="1"/>
-              <a:t>andas</a:t>
+              <a:rPr lang="en-CH" dirty="0" err="1"/>
+              <a:t>Kinetische</a:t>
+            </a:r>
+            <a:r>
+              <a:rPr lang="en-CH" dirty="0"/>
+              <a:t> </a:t>
+            </a:r>
+            <a:r>
+              <a:rPr lang="en-CH" dirty="0" err="1"/>
+              <a:t>Energie</a:t>
             </a:r>
             <a:endParaRPr lang="en-CH" dirty="0"/>
           </a:p>
           <a:p>
             <a:pPr lvl="1"/>
-            <a:r>
-              <a:rPr lang="en-CH" dirty="0" err="1"/>
-              <a:t>Daten</a:t>
-            </a:r>
-            <a:r>
-              <a:rPr lang="en-CH" dirty="0"/>
-              <a:t> </a:t>
-            </a:r>
-            <a:r>
-              <a:rPr lang="en-CH" dirty="0" err="1"/>
-              <a:t>lesen</a:t>
-            </a:r>
-            <a:r>
-              <a:rPr lang="en-CH" dirty="0"/>
-              <a:t> </a:t>
-            </a:r>
+            <a:endParaRPr lang="en-CH" dirty="0"/>
           </a:p>
           <a:p>
             <a:pPr lvl="1"/>
-            <a:r>
-              <a:rPr lang="en-CH" dirty="0" err="1"/>
-              <a:t>Daten</a:t>
-            </a:r>
-            <a:r>
-              <a:rPr lang="en-CH" dirty="0"/>
-              <a:t> </a:t>
-            </a:r>
-            <a:r>
-              <a:rPr lang="en-CH" dirty="0" err="1"/>
-              <a:t>cleanen</a:t>
-            </a:r>
             <a:endParaRPr lang="en-CH" dirty="0"/>
           </a:p>
           <a:p>
             <a:pPr lvl="1"/>
-            <a:r>
-              <a:rPr lang="en-CH" dirty="0" err="1"/>
-              <a:t>Daten</a:t>
-            </a:r>
-            <a:r>
-              <a:rPr lang="en-CH" dirty="0"/>
-              <a:t> </a:t>
-            </a:r>
-            <a:r>
-              <a:rPr lang="en-CH" dirty="0" err="1"/>
-              <a:t>ergänzen</a:t>
-            </a:r>
-            <a:endParaRPr lang="en-CH" dirty="0"/>
-          </a:p>
-          <a:p>
-            <a:r>
-              <a:rPr lang="de-CH" dirty="0"/>
-              <a:t>N</a:t>
-            </a:r>
-            <a:r>
-              <a:rPr lang="en-CH" dirty="0" err="1"/>
-              <a:t>umpy</a:t>
-            </a:r>
-            <a:endParaRPr lang="en-CH" dirty="0"/>
-          </a:p>
-          <a:p>
-            <a:pPr lvl="1"/>
-            <a:r>
-              <a:rPr lang="en-CH" dirty="0" err="1"/>
-              <a:t>Ergänzungsfunktionen</a:t>
-            </a:r>
-            <a:r>
-              <a:rPr lang="en-CH" dirty="0"/>
-              <a:t> für Pandas arrays</a:t>
-            </a:r>
-          </a:p>
-          <a:p>
-            <a:pPr lvl="1"/>
-            <a:r>
-              <a:rPr lang="en-CH" dirty="0" err="1"/>
-              <a:t>Verteilungsparameter</a:t>
-            </a:r>
-            <a:r>
-              <a:rPr lang="en-CH" dirty="0"/>
-              <a:t> </a:t>
-            </a:r>
-            <a:r>
-              <a:rPr lang="en-CH" dirty="0" err="1"/>
-              <a:t>bestimmen</a:t>
-            </a:r>
-            <a:endParaRPr lang="en-CH" dirty="0"/>
-          </a:p>
-          <a:p>
-            <a:pPr lvl="1"/>
-            <a:r>
-              <a:rPr lang="de-CH" dirty="0"/>
-              <a:t>Z</a:t>
-            </a:r>
-            <a:r>
-              <a:rPr lang="en-CH" dirty="0" err="1"/>
-              <a:t>ufällige</a:t>
-            </a:r>
-            <a:r>
-              <a:rPr lang="en-CH" dirty="0"/>
-              <a:t> </a:t>
-            </a:r>
-            <a:r>
-              <a:rPr lang="en-CH" dirty="0" err="1"/>
-              <a:t>Erzeugung</a:t>
-            </a:r>
-            <a:r>
-              <a:rPr lang="en-CH" dirty="0"/>
-              <a:t> von </a:t>
-            </a:r>
-            <a:r>
-              <a:rPr lang="en-CH" dirty="0" err="1"/>
-              <a:t>Werten</a:t>
-            </a:r>
-            <a:endParaRPr lang="en-CH" dirty="0"/>
-          </a:p>
-          <a:p>
-            <a:r>
-              <a:rPr lang="de-CH" dirty="0"/>
-              <a:t>S</a:t>
-            </a:r>
-            <a:r>
-              <a:rPr lang="en-CH" dirty="0" err="1"/>
-              <a:t>cipy</a:t>
-            </a:r>
-            <a:endParaRPr lang="en-CH" dirty="0"/>
-          </a:p>
-          <a:p>
-            <a:pPr lvl="1"/>
-            <a:r>
-              <a:rPr lang="en-CH" dirty="0"/>
-              <a:t>K</a:t>
-            </a:r>
-            <a:r>
-              <a:rPr lang="de-CH" dirty="0"/>
-              <a:t>olmogorov </a:t>
-            </a:r>
-            <a:r>
-              <a:rPr lang="en-CH" dirty="0"/>
-              <a:t>S</a:t>
-            </a:r>
-            <a:r>
-              <a:rPr lang="de-CH" dirty="0"/>
-              <a:t>mirnov </a:t>
-            </a:r>
-            <a:r>
-              <a:rPr lang="en-CH" dirty="0"/>
-              <a:t>T</a:t>
-            </a:r>
-            <a:r>
-              <a:rPr lang="de-CH" dirty="0"/>
-              <a:t>est</a:t>
-            </a:r>
-            <a:r>
-              <a:rPr lang="en-CH" dirty="0"/>
-              <a:t> </a:t>
-            </a:r>
-            <a:r>
-              <a:rPr lang="en-CH" dirty="0" err="1"/>
-              <a:t>durchführen</a:t>
-            </a:r>
-            <a:endParaRPr lang="en-CH" dirty="0"/>
-          </a:p>
-          <a:p>
-            <a:r>
-              <a:rPr lang="de-CH" dirty="0"/>
-              <a:t>M</a:t>
-            </a:r>
-            <a:r>
-              <a:rPr lang="en-CH" dirty="0" err="1"/>
-              <a:t>atplotlib</a:t>
-            </a:r>
-            <a:endParaRPr lang="en-CH" dirty="0"/>
-          </a:p>
-          <a:p>
-            <a:pPr lvl="1"/>
-            <a:r>
-              <a:rPr lang="en-CH" dirty="0" err="1"/>
-              <a:t>Plotten</a:t>
-            </a:r>
-            <a:r>
-              <a:rPr lang="en-CH" dirty="0"/>
-              <a:t> von </a:t>
-            </a:r>
-            <a:r>
-              <a:rPr lang="en-CH" dirty="0" err="1"/>
-              <a:t>Verteilungen</a:t>
-            </a:r>
-            <a:endParaRPr lang="en-CH" dirty="0"/>
-          </a:p>
-          <a:p>
-            <a:endParaRPr lang="en-CH" dirty="0"/>
-          </a:p>
-        </p:txBody>
-      </p:sp>
+            <a:endParaRPr lang="de-CH" dirty="0"/>
+          </a:p>
+        </p:txBody>
+      </p:sp>
+      <p:pic>
+        <p:nvPicPr>
+          <p:cNvPr id="6" name="Graphic 5">
+            <a:extLst>
+              <a:ext uri="{FF2B5EF4-FFF2-40B4-BE49-F238E27FC236}">
+                <a16:creationId xmlns:a16="http://schemas.microsoft.com/office/drawing/2014/main" id="{28E98A74-1817-4503-8B1A-DE4DF558973E}"/>
+              </a:ext>
+            </a:extLst>
+          </p:cNvPr>
+          <p:cNvPicPr>
+            <a:picLocks noChangeAspect="1"/>
+          </p:cNvPicPr>
+          <p:nvPr/>
+        </p:nvPicPr>
+        <p:blipFill>
+          <a:blip r:embed="rId3">
+            <a:extLst>
+              <a:ext uri="{28A0092B-C50C-407E-A947-70E740481C1C}">
+                <a14:useLocalDpi xmlns:a14="http://schemas.microsoft.com/office/drawing/2010/main" val="0"/>
+              </a:ext>
+              <a:ext uri="{96DAC541-7B7A-43D3-8B79-37D633B846F1}">
+                <asvg:svgBlip xmlns:asvg="http://schemas.microsoft.com/office/drawing/2016/SVG/main" r:embed="rId4"/>
+              </a:ext>
+            </a:extLst>
+          </a:blip>
+          <a:stretch>
+            <a:fillRect/>
+          </a:stretch>
+        </p:blipFill>
+        <p:spPr>
+          <a:xfrm>
+            <a:off x="838200" y="2262982"/>
+            <a:ext cx="5158861" cy="1738312"/>
+          </a:xfrm>
+          <a:prstGeom prst="rect">
+            <a:avLst/>
+          </a:prstGeom>
+        </p:spPr>
+      </p:pic>
     </p:spTree>
     <p:extLst>
       <p:ext uri="{BB962C8B-B14F-4D97-AF65-F5344CB8AC3E}">
-        <p14:creationId xmlns:p14="http://schemas.microsoft.com/office/powerpoint/2010/main" val="3901308089"/>
+        <p14:creationId xmlns:p14="http://schemas.microsoft.com/office/powerpoint/2010/main" val="4081397304"/>
       </p:ext>
     </p:extLst>
   </p:cSld>
@@ -3830,7 +5697,7 @@
           <p:cNvPr id="2" name="Title 1">
             <a:extLst>
               <a:ext uri="{FF2B5EF4-FFF2-40B4-BE49-F238E27FC236}">
-                <a16:creationId xmlns:a16="http://schemas.microsoft.com/office/drawing/2014/main" id="{9B2E639B-1879-4C21-B581-9CA021F14725}"/>
+                <a16:creationId xmlns:a16="http://schemas.microsoft.com/office/drawing/2014/main" id="{3FFE9CB6-6A95-49F4-849D-F350E1FACA32}"/>
               </a:ext>
             </a:extLst>
           </p:cNvPr>
@@ -3848,97 +5715,442 @@
           <a:p>
             <a:r>
               <a:rPr lang="en-CH" dirty="0" err="1"/>
-              <a:t>Physikalische</a:t>
-            </a:r>
-            <a:r>
-              <a:rPr lang="en-CH" dirty="0"/>
-              <a:t> </a:t>
-            </a:r>
-            <a:r>
-              <a:rPr lang="en-CH" dirty="0" err="1"/>
-              <a:t>Formeln</a:t>
+              <a:t>Verteilungen</a:t>
+            </a:r>
+            <a:r>
+              <a:rPr lang="en-CH" dirty="0"/>
+              <a:t>	</a:t>
             </a:r>
             <a:endParaRPr lang="de-CH" dirty="0"/>
           </a:p>
         </p:txBody>
       </p:sp>
-      <p:sp>
-        <p:nvSpPr>
-          <p:cNvPr id="3" name="Content Placeholder 2">
-            <a:extLst>
-              <a:ext uri="{FF2B5EF4-FFF2-40B4-BE49-F238E27FC236}">
-                <a16:creationId xmlns:a16="http://schemas.microsoft.com/office/drawing/2014/main" id="{81E25CF7-F6AE-4E1A-AAFA-15BE43C99247}"/>
-              </a:ext>
-            </a:extLst>
-          </p:cNvPr>
-          <p:cNvSpPr>
-            <a:spLocks noGrp="1"/>
-          </p:cNvSpPr>
-          <p:nvPr>
-            <p:ph idx="1"/>
-          </p:nvPr>
-        </p:nvSpPr>
-        <p:spPr/>
-        <p:txBody>
-          <a:bodyPr/>
-          <a:lstStyle/>
-          <a:p>
-            <a:r>
-              <a:rPr lang="en-CH" dirty="0" err="1"/>
-              <a:t>Kinetische</a:t>
-            </a:r>
-            <a:r>
-              <a:rPr lang="en-CH" dirty="0"/>
-              <a:t> </a:t>
-            </a:r>
-            <a:r>
-              <a:rPr lang="en-CH" dirty="0" err="1"/>
-              <a:t>Energie</a:t>
-            </a:r>
-            <a:endParaRPr lang="en-CH" dirty="0"/>
-          </a:p>
-          <a:p>
-            <a:pPr lvl="1"/>
-            <a:r>
-              <a:rPr lang="de-CH" dirty="0"/>
-              <a:t>KE</a:t>
-            </a:r>
-            <a:r>
-              <a:rPr lang="en-CH" dirty="0"/>
-              <a:t> </a:t>
-            </a:r>
-            <a:r>
-              <a:rPr lang="de-CH" dirty="0"/>
-              <a:t>=</a:t>
-            </a:r>
-            <a:r>
-              <a:rPr lang="en-CH" dirty="0"/>
-              <a:t> </a:t>
-            </a:r>
-            <a:r>
-              <a:rPr lang="de-CH" dirty="0"/>
-              <a:t>1/2m</a:t>
-            </a:r>
-            <a:r>
-              <a:rPr lang="en-CH" dirty="0"/>
-              <a:t>*</a:t>
-            </a:r>
-            <a:r>
-              <a:rPr lang="de-CH" dirty="0"/>
-              <a:t>v^2</a:t>
-            </a:r>
-            <a:endParaRPr lang="en-CH" dirty="0"/>
-          </a:p>
-          <a:p>
-            <a:pPr lvl="1"/>
-            <a:endParaRPr lang="de-CH" dirty="0"/>
-          </a:p>
-        </p:txBody>
-      </p:sp>
+      <p:graphicFrame>
+        <p:nvGraphicFramePr>
+          <p:cNvPr id="7" name="Table 7">
+            <a:extLst>
+              <a:ext uri="{FF2B5EF4-FFF2-40B4-BE49-F238E27FC236}">
+                <a16:creationId xmlns:a16="http://schemas.microsoft.com/office/drawing/2014/main" id="{82505E29-5BE0-4C62-9428-2896888670AE}"/>
+              </a:ext>
+            </a:extLst>
+          </p:cNvPr>
+          <p:cNvGraphicFramePr>
+            <a:graphicFrameLocks noGrp="1"/>
+          </p:cNvGraphicFramePr>
+          <p:nvPr>
+            <p:extLst>
+              <p:ext uri="{D42A27DB-BD31-4B8C-83A1-F6EECF244321}">
+                <p14:modId xmlns:p14="http://schemas.microsoft.com/office/powerpoint/2010/main" val="771989199"/>
+              </p:ext>
+            </p:extLst>
+          </p:nvPr>
+        </p:nvGraphicFramePr>
+        <p:xfrm>
+          <a:off x="953881" y="1337961"/>
+          <a:ext cx="10057020" cy="5097672"/>
+        </p:xfrm>
+        <a:graphic>
+          <a:graphicData uri="http://schemas.openxmlformats.org/drawingml/2006/table">
+            <a:tbl>
+              <a:tblPr>
+                <a:tableStyleId>{5C22544A-7EE6-4342-B048-85BDC9FD1C3A}</a:tableStyleId>
+              </a:tblPr>
+              <a:tblGrid>
+                <a:gridCol w="5028510">
+                  <a:extLst>
+                    <a:ext uri="{9D8B030D-6E8A-4147-A177-3AD203B41FA5}">
+                      <a16:colId xmlns:a16="http://schemas.microsoft.com/office/drawing/2014/main" val="1436222078"/>
+                    </a:ext>
+                  </a:extLst>
+                </a:gridCol>
+                <a:gridCol w="5028510">
+                  <a:extLst>
+                    <a:ext uri="{9D8B030D-6E8A-4147-A177-3AD203B41FA5}">
+                      <a16:colId xmlns:a16="http://schemas.microsoft.com/office/drawing/2014/main" val="686116632"/>
+                    </a:ext>
+                  </a:extLst>
+                </a:gridCol>
+              </a:tblGrid>
+              <a:tr h="1795872">
+                <a:tc>
+                  <a:txBody>
+                    <a:bodyPr/>
+                    <a:lstStyle/>
+                    <a:p>
+                      <a:pPr marL="0" indent="0">
+                        <a:buFont typeface="Arial" panose="020B0604020202020204" pitchFamily="34" charset="0"/>
+                        <a:buNone/>
+                      </a:pPr>
+                      <a:r>
+                        <a:rPr lang="en-CH" dirty="0" err="1"/>
+                        <a:t>Normalverteilung</a:t>
+                      </a:r>
+                      <a:endParaRPr lang="en-CH" dirty="0"/>
+                    </a:p>
+                    <a:p>
+                      <a:pPr marL="285750" lvl="0" indent="-285750">
+                        <a:buFont typeface="Arial" panose="020B0604020202020204" pitchFamily="34" charset="0"/>
+                        <a:buChar char="•"/>
+                      </a:pPr>
+                      <a:r>
+                        <a:rPr lang="en-CH" dirty="0"/>
+                        <a:t>Parameter</a:t>
+                      </a:r>
+                    </a:p>
+                    <a:p>
+                      <a:pPr marL="742950" lvl="1" indent="-285750">
+                        <a:buFont typeface="Arial" panose="020B0604020202020204" pitchFamily="34" charset="0"/>
+                        <a:buChar char="•"/>
+                      </a:pPr>
+                      <a:r>
+                        <a:rPr lang="en-CH" dirty="0" err="1"/>
+                        <a:t>Standardabweichung</a:t>
+                      </a:r>
+                      <a:endParaRPr lang="en-CH" dirty="0"/>
+                    </a:p>
+                    <a:p>
+                      <a:pPr marL="742950" lvl="1" indent="-285750">
+                        <a:buFont typeface="Arial" panose="020B0604020202020204" pitchFamily="34" charset="0"/>
+                        <a:buChar char="•"/>
+                      </a:pPr>
+                      <a:r>
+                        <a:rPr lang="en-CH" dirty="0" err="1"/>
+                        <a:t>Mittelwert</a:t>
+                      </a:r>
+                      <a:endParaRPr lang="en-CH" dirty="0"/>
+                    </a:p>
+                    <a:p>
+                      <a:pPr marL="285750" indent="-285750">
+                        <a:buFont typeface="Arial" panose="020B0604020202020204" pitchFamily="34" charset="0"/>
+                        <a:buChar char="•"/>
+                      </a:pPr>
+                      <a:endParaRPr lang="en-CH" dirty="0"/>
+                    </a:p>
+                    <a:p>
+                      <a:pPr marL="285750" indent="-285750">
+                        <a:buFont typeface="Arial" panose="020B0604020202020204" pitchFamily="34" charset="0"/>
+                        <a:buChar char="•"/>
+                      </a:pPr>
+                      <a:endParaRPr lang="en-CH" dirty="0"/>
+                    </a:p>
+                    <a:p>
+                      <a:pPr marL="285750" indent="-285750">
+                        <a:buFont typeface="Arial" panose="020B0604020202020204" pitchFamily="34" charset="0"/>
+                        <a:buChar char="•"/>
+                      </a:pPr>
+                      <a:endParaRPr lang="de-CH" dirty="0"/>
+                    </a:p>
+                  </a:txBody>
+                  <a:tcPr>
+                    <a:solidFill>
+                      <a:schemeClr val="bg1"/>
+                    </a:solidFill>
+                  </a:tcPr>
+                </a:tc>
+                <a:tc>
+                  <a:txBody>
+                    <a:bodyPr/>
+                    <a:lstStyle/>
+                    <a:p>
+                      <a:endParaRPr lang="de-CH" dirty="0"/>
+                    </a:p>
+                  </a:txBody>
+                  <a:tcPr>
+                    <a:solidFill>
+                      <a:schemeClr val="bg1"/>
+                    </a:solidFill>
+                  </a:tcPr>
+                </a:tc>
+                <a:extLst>
+                  <a:ext uri="{0D108BD9-81ED-4DB2-BD59-A6C34878D82A}">
+                    <a16:rowId xmlns:a16="http://schemas.microsoft.com/office/drawing/2014/main" val="3848584568"/>
+                  </a:ext>
+                </a:extLst>
+              </a:tr>
+              <a:tr h="1542996">
+                <a:tc>
+                  <a:txBody>
+                    <a:bodyPr/>
+                    <a:lstStyle/>
+                    <a:p>
+                      <a:pPr marL="0" indent="0">
+                        <a:buFont typeface="Arial" panose="020B0604020202020204" pitchFamily="34" charset="0"/>
+                        <a:buNone/>
+                      </a:pPr>
+                      <a:r>
+                        <a:rPr lang="en-CH" dirty="0" err="1"/>
+                        <a:t>Exponentialverteilung</a:t>
+                      </a:r>
+                      <a:endParaRPr lang="en-CH" dirty="0"/>
+                    </a:p>
+                    <a:p>
+                      <a:pPr marL="285750" lvl="0" indent="-285750">
+                        <a:buFont typeface="Arial" panose="020B0604020202020204" pitchFamily="34" charset="0"/>
+                        <a:buChar char="•"/>
+                      </a:pPr>
+                      <a:r>
+                        <a:rPr lang="en-CH" dirty="0"/>
+                        <a:t>Parameter </a:t>
+                      </a:r>
+                    </a:p>
+                    <a:p>
+                      <a:pPr marL="742950" lvl="1" indent="-285750">
+                        <a:buFont typeface="Arial" panose="020B0604020202020204" pitchFamily="34" charset="0"/>
+                        <a:buChar char="•"/>
+                      </a:pPr>
+                      <a:r>
+                        <a:rPr lang="en-CH" dirty="0" err="1"/>
+                        <a:t>Mittelwert</a:t>
+                      </a:r>
+                      <a:endParaRPr lang="en-CH" dirty="0"/>
+                    </a:p>
+                    <a:p>
+                      <a:pPr marL="285750" indent="-285750">
+                        <a:buFont typeface="Arial" panose="020B0604020202020204" pitchFamily="34" charset="0"/>
+                        <a:buChar char="•"/>
+                      </a:pPr>
+                      <a:endParaRPr lang="de-CH" dirty="0"/>
+                    </a:p>
+                  </a:txBody>
+                  <a:tcPr>
+                    <a:solidFill>
+                      <a:schemeClr val="bg1"/>
+                    </a:solidFill>
+                  </a:tcPr>
+                </a:tc>
+                <a:tc>
+                  <a:txBody>
+                    <a:bodyPr/>
+                    <a:lstStyle/>
+                    <a:p>
+                      <a:endParaRPr lang="de-CH" dirty="0"/>
+                    </a:p>
+                  </a:txBody>
+                  <a:tcPr>
+                    <a:solidFill>
+                      <a:schemeClr val="bg1"/>
+                    </a:solidFill>
+                  </a:tcPr>
+                </a:tc>
+                <a:extLst>
+                  <a:ext uri="{0D108BD9-81ED-4DB2-BD59-A6C34878D82A}">
+                    <a16:rowId xmlns:a16="http://schemas.microsoft.com/office/drawing/2014/main" val="4284255793"/>
+                  </a:ext>
+                </a:extLst>
+              </a:tr>
+              <a:tr h="1542996">
+                <a:tc>
+                  <a:txBody>
+                    <a:bodyPr/>
+                    <a:lstStyle/>
+                    <a:p>
+                      <a:r>
+                        <a:rPr lang="en-CH" dirty="0" err="1"/>
+                        <a:t>Gammaverteilung</a:t>
+                      </a:r>
+                      <a:endParaRPr lang="en-CH" dirty="0"/>
+                    </a:p>
+                    <a:p>
+                      <a:pPr marL="285750" lvl="0" indent="-285750">
+                        <a:buFont typeface="Arial" panose="020B0604020202020204" pitchFamily="34" charset="0"/>
+                        <a:buChar char="•"/>
+                      </a:pPr>
+                      <a:r>
+                        <a:rPr lang="en-CH" dirty="0"/>
+                        <a:t>Parameter </a:t>
+                      </a:r>
+                    </a:p>
+                    <a:p>
+                      <a:pPr marL="742950" lvl="1" indent="-285750">
+                        <a:buFont typeface="Arial" panose="020B0604020202020204" pitchFamily="34" charset="0"/>
+                        <a:buChar char="•"/>
+                      </a:pPr>
+                      <a:r>
+                        <a:rPr lang="en-CH" dirty="0" err="1"/>
+                        <a:t>Mittelwert</a:t>
+                      </a:r>
+                      <a:r>
+                        <a:rPr lang="en-CH" dirty="0"/>
+                        <a:t> </a:t>
+                      </a:r>
+                    </a:p>
+                    <a:p>
+                      <a:pPr marL="285750" indent="-285750">
+                        <a:buFont typeface="Arial" panose="020B0604020202020204" pitchFamily="34" charset="0"/>
+                        <a:buChar char="•"/>
+                      </a:pPr>
+                      <a:endParaRPr lang="de-CH" dirty="0"/>
+                    </a:p>
+                  </a:txBody>
+                  <a:tcPr>
+                    <a:solidFill>
+                      <a:schemeClr val="bg1"/>
+                    </a:solidFill>
+                  </a:tcPr>
+                </a:tc>
+                <a:tc>
+                  <a:txBody>
+                    <a:bodyPr/>
+                    <a:lstStyle/>
+                    <a:p>
+                      <a:endParaRPr lang="de-CH" dirty="0"/>
+                    </a:p>
+                  </a:txBody>
+                  <a:tcPr>
+                    <a:solidFill>
+                      <a:schemeClr val="bg1"/>
+                    </a:solidFill>
+                  </a:tcPr>
+                </a:tc>
+                <a:extLst>
+                  <a:ext uri="{0D108BD9-81ED-4DB2-BD59-A6C34878D82A}">
+                    <a16:rowId xmlns:a16="http://schemas.microsoft.com/office/drawing/2014/main" val="2605895223"/>
+                  </a:ext>
+                </a:extLst>
+              </a:tr>
+            </a:tbl>
+          </a:graphicData>
+        </a:graphic>
+      </p:graphicFrame>
+      <p:pic>
+        <p:nvPicPr>
+          <p:cNvPr id="14" name="Picture 2">
+            <a:extLst>
+              <a:ext uri="{FF2B5EF4-FFF2-40B4-BE49-F238E27FC236}">
+                <a16:creationId xmlns:a16="http://schemas.microsoft.com/office/drawing/2014/main" id="{2118A5B7-7A76-41AF-A80A-A8277CDA9F7E}"/>
+              </a:ext>
+            </a:extLst>
+          </p:cNvPr>
+          <p:cNvPicPr>
+            <a:picLocks noChangeAspect="1" noChangeArrowheads="1"/>
+          </p:cNvPicPr>
+          <p:nvPr/>
+        </p:nvPicPr>
+        <p:blipFill rotWithShape="1">
+          <a:blip r:embed="rId3">
+            <a:extLst>
+              <a:ext uri="{28A0092B-C50C-407E-A947-70E740481C1C}">
+                <a14:useLocalDpi xmlns:a14="http://schemas.microsoft.com/office/drawing/2010/main" val="0"/>
+              </a:ext>
+            </a:extLst>
+          </a:blip>
+          <a:srcRect l="12059" t="10533" r="2151" b="13940"/>
+          <a:stretch/>
+        </p:blipFill>
+        <p:spPr bwMode="auto">
+          <a:xfrm>
+            <a:off x="4053370" y="1337961"/>
+            <a:ext cx="2528527" cy="1620000"/>
+          </a:xfrm>
+          <a:prstGeom prst="rect">
+            <a:avLst/>
+          </a:prstGeom>
+          <a:noFill/>
+          <a:extLst>
+            <a:ext uri="{909E8E84-426E-40DD-AFC4-6F175D3DCCD1}">
+              <a14:hiddenFill xmlns:a14="http://schemas.microsoft.com/office/drawing/2010/main">
+                <a:solidFill>
+                  <a:srgbClr val="FFFFFF"/>
+                </a:solidFill>
+              </a14:hiddenFill>
+            </a:ext>
+          </a:extLst>
+        </p:spPr>
+      </p:pic>
+      <p:pic>
+        <p:nvPicPr>
+          <p:cNvPr id="3073" name="Picture 1">
+            <a:extLst>
+              <a:ext uri="{FF2B5EF4-FFF2-40B4-BE49-F238E27FC236}">
+                <a16:creationId xmlns:a16="http://schemas.microsoft.com/office/drawing/2014/main" id="{44C75F72-656C-4287-AD88-3F781CF61D82}"/>
+              </a:ext>
+            </a:extLst>
+          </p:cNvPr>
+          <p:cNvPicPr>
+            <a:picLocks noChangeAspect="1" noChangeArrowheads="1"/>
+          </p:cNvPicPr>
+          <p:nvPr/>
+        </p:nvPicPr>
+        <p:blipFill rotWithShape="1">
+          <a:blip r:embed="rId4">
+            <a:extLst>
+              <a:ext uri="{28A0092B-C50C-407E-A947-70E740481C1C}">
+                <a14:useLocalDpi xmlns:a14="http://schemas.microsoft.com/office/drawing/2010/main" val="0"/>
+              </a:ext>
+            </a:extLst>
+          </a:blip>
+          <a:srcRect l="9640" t="8644" r="2791" b="13155"/>
+          <a:stretch/>
+        </p:blipFill>
+        <p:spPr bwMode="auto">
+          <a:xfrm>
+            <a:off x="4048508" y="3195633"/>
+            <a:ext cx="2453578" cy="1620000"/>
+          </a:xfrm>
+          <a:prstGeom prst="rect">
+            <a:avLst/>
+          </a:prstGeom>
+          <a:noFill/>
+          <a:extLst>
+            <a:ext uri="{909E8E84-426E-40DD-AFC4-6F175D3DCCD1}">
+              <a14:hiddenFill xmlns:a14="http://schemas.microsoft.com/office/drawing/2010/main">
+                <a:solidFill>
+                  <a:srgbClr val="FFFFFF"/>
+                </a:solidFill>
+              </a14:hiddenFill>
+            </a:ext>
+          </a:extLst>
+        </p:spPr>
+      </p:pic>
+      <p:pic>
+        <p:nvPicPr>
+          <p:cNvPr id="6" name="Picture 2">
+            <a:extLst>
+              <a:ext uri="{FF2B5EF4-FFF2-40B4-BE49-F238E27FC236}">
+                <a16:creationId xmlns:a16="http://schemas.microsoft.com/office/drawing/2014/main" id="{7377A287-63F7-41F6-A8BB-A5E78E0ABDFB}"/>
+              </a:ext>
+            </a:extLst>
+          </p:cNvPr>
+          <p:cNvPicPr>
+            <a:picLocks noChangeAspect="1" noChangeArrowheads="1"/>
+          </p:cNvPicPr>
+          <p:nvPr/>
+        </p:nvPicPr>
+        <p:blipFill rotWithShape="1">
+          <a:blip r:embed="rId5">
+            <a:extLst>
+              <a:ext uri="{28A0092B-C50C-407E-A947-70E740481C1C}">
+                <a14:useLocalDpi xmlns:a14="http://schemas.microsoft.com/office/drawing/2010/main" val="0"/>
+              </a:ext>
+            </a:extLst>
+          </a:blip>
+          <a:srcRect l="11563" t="8644" r="1891" b="13379"/>
+          <a:stretch/>
+        </p:blipFill>
+        <p:spPr bwMode="auto">
+          <a:xfrm>
+            <a:off x="4039973" y="5053305"/>
+            <a:ext cx="2470648" cy="1620000"/>
+          </a:xfrm>
+          <a:prstGeom prst="rect">
+            <a:avLst/>
+          </a:prstGeom>
+          <a:noFill/>
+          <a:extLst>
+            <a:ext uri="{909E8E84-426E-40DD-AFC4-6F175D3DCCD1}">
+              <a14:hiddenFill xmlns:a14="http://schemas.microsoft.com/office/drawing/2010/main">
+                <a:solidFill>
+                  <a:srgbClr val="FFFFFF"/>
+                </a:solidFill>
+              </a14:hiddenFill>
+            </a:ext>
+          </a:extLst>
+        </p:spPr>
+      </p:pic>
     </p:spTree>
     <p:extLst>
       <p:ext uri="{BB962C8B-B14F-4D97-AF65-F5344CB8AC3E}">
-        <p14:creationId xmlns:p14="http://schemas.microsoft.com/office/powerpoint/2010/main" val="4081397304"/>
+        <p14:creationId xmlns:p14="http://schemas.microsoft.com/office/powerpoint/2010/main" val="1842362962"/>
       </p:ext>
     </p:extLst>
   </p:cSld>
@@ -3970,7 +6182,7 @@
           <p:cNvPr id="2" name="Title 1">
             <a:extLst>
               <a:ext uri="{FF2B5EF4-FFF2-40B4-BE49-F238E27FC236}">
-                <a16:creationId xmlns:a16="http://schemas.microsoft.com/office/drawing/2014/main" id="{3FFE9CB6-6A95-49F4-849D-F350E1FACA32}"/>
+                <a16:creationId xmlns:a16="http://schemas.microsoft.com/office/drawing/2014/main" id="{473DFDB8-2088-46C9-B096-FF3EF63A2BD3}"/>
               </a:ext>
             </a:extLst>
           </p:cNvPr>
@@ -3987,12 +6199,8 @@
           <a:lstStyle/>
           <a:p>
             <a:r>
-              <a:rPr lang="en-CH" dirty="0" err="1"/>
-              <a:t>Verteilungen</a:t>
-            </a:r>
-            <a:r>
-              <a:rPr lang="en-CH" dirty="0"/>
-              <a:t>	</a:t>
+              <a:rPr lang="en-CH" dirty="0"/>
+              <a:t>Monte Carlo Simulation</a:t>
             </a:r>
             <a:endParaRPr lang="de-CH" dirty="0"/>
           </a:p>
@@ -4003,7 +6211,7 @@
           <p:cNvPr id="3" name="Content Placeholder 2">
             <a:extLst>
               <a:ext uri="{FF2B5EF4-FFF2-40B4-BE49-F238E27FC236}">
-                <a16:creationId xmlns:a16="http://schemas.microsoft.com/office/drawing/2014/main" id="{E3AEC211-0CD6-4AE2-9D10-58A5068A3B3C}"/>
+                <a16:creationId xmlns:a16="http://schemas.microsoft.com/office/drawing/2014/main" id="{4E2E7064-02ED-49A7-AA6B-1FDDC1EC4EB8}"/>
               </a:ext>
             </a:extLst>
           </p:cNvPr>
@@ -4021,74 +6229,62 @@
           <a:p>
             <a:r>
               <a:rPr lang="en-CH" dirty="0" err="1"/>
-              <a:t>Normalverteilung</a:t>
+              <a:t>Erzeugung</a:t>
+            </a:r>
+            <a:r>
+              <a:rPr lang="en-CH" dirty="0"/>
+              <a:t> von </a:t>
+            </a:r>
+            <a:r>
+              <a:rPr lang="en-CH" dirty="0" err="1"/>
+              <a:t>neuen</a:t>
+            </a:r>
+            <a:r>
+              <a:rPr lang="en-CH" dirty="0"/>
+              <a:t> </a:t>
+            </a:r>
+            <a:r>
+              <a:rPr lang="en-CH" dirty="0" err="1"/>
+              <a:t>Werten</a:t>
+            </a:r>
+            <a:r>
+              <a:rPr lang="en-CH" dirty="0"/>
+              <a:t> </a:t>
+            </a:r>
+            <a:r>
+              <a:rPr lang="en-CH" dirty="0" err="1"/>
+              <a:t>mittels</a:t>
+            </a:r>
+            <a:r>
+              <a:rPr lang="en-CH" dirty="0"/>
+              <a:t> </a:t>
+            </a:r>
+            <a:r>
+              <a:rPr lang="en-CH" dirty="0" err="1"/>
+              <a:t>Verteilungsparameter</a:t>
+            </a:r>
+            <a:r>
+              <a:rPr lang="en-CH" dirty="0"/>
+              <a:t> und </a:t>
+            </a:r>
+            <a:r>
+              <a:rPr lang="en-CH" dirty="0" err="1"/>
+              <a:t>Verteilungen</a:t>
             </a:r>
             <a:endParaRPr lang="en-CH" dirty="0"/>
           </a:p>
           <a:p>
-            <a:pPr lvl="1"/>
-            <a:r>
-              <a:rPr lang="en-CH" dirty="0"/>
-              <a:t>Parameter </a:t>
-            </a:r>
-            <a:r>
-              <a:rPr lang="en-CH" dirty="0" err="1"/>
-              <a:t>Standardabweichung</a:t>
-            </a:r>
-            <a:r>
-              <a:rPr lang="en-CH" dirty="0"/>
-              <a:t> und </a:t>
-            </a:r>
-            <a:r>
-              <a:rPr lang="en-CH" dirty="0" err="1"/>
-              <a:t>Mittelwert</a:t>
-            </a:r>
             <a:endParaRPr lang="en-CH" dirty="0"/>
           </a:p>
           <a:p>
-            <a:r>
-              <a:rPr lang="en-CH" dirty="0" err="1"/>
-              <a:t>Exponentialverteilung</a:t>
-            </a:r>
-            <a:endParaRPr lang="en-CH" dirty="0"/>
-          </a:p>
-          <a:p>
-            <a:pPr lvl="1"/>
-            <a:r>
-              <a:rPr lang="en-CH" dirty="0"/>
-              <a:t>Parameter </a:t>
-            </a:r>
-            <a:r>
-              <a:rPr lang="en-CH" dirty="0" err="1"/>
-              <a:t>Mittelwert</a:t>
-            </a:r>
-            <a:endParaRPr lang="en-CH" dirty="0"/>
-          </a:p>
-          <a:p>
-            <a:r>
-              <a:rPr lang="en-CH" dirty="0" err="1"/>
-              <a:t>Gammaverteilung</a:t>
-            </a:r>
-            <a:endParaRPr lang="en-CH" dirty="0"/>
-          </a:p>
-          <a:p>
-            <a:pPr lvl="1"/>
-            <a:r>
-              <a:rPr lang="en-CH" dirty="0"/>
-              <a:t>Parameter </a:t>
-            </a:r>
-            <a:r>
-              <a:rPr lang="en-CH" dirty="0" err="1"/>
-              <a:t>Mittelwert</a:t>
-            </a:r>
-            <a:endParaRPr lang="en-CH" dirty="0"/>
+            <a:endParaRPr lang="de-CH" dirty="0"/>
           </a:p>
         </p:txBody>
       </p:sp>
     </p:spTree>
     <p:extLst>
       <p:ext uri="{BB962C8B-B14F-4D97-AF65-F5344CB8AC3E}">
-        <p14:creationId xmlns:p14="http://schemas.microsoft.com/office/powerpoint/2010/main" val="1842362962"/>
+        <p14:creationId xmlns:p14="http://schemas.microsoft.com/office/powerpoint/2010/main" val="950212034"/>
       </p:ext>
     </p:extLst>
   </p:cSld>
@@ -4120,7 +6316,7 @@
           <p:cNvPr id="2" name="Title 1">
             <a:extLst>
               <a:ext uri="{FF2B5EF4-FFF2-40B4-BE49-F238E27FC236}">
-                <a16:creationId xmlns:a16="http://schemas.microsoft.com/office/drawing/2014/main" id="{473DFDB8-2088-46C9-B096-FF3EF63A2BD3}"/>
+                <a16:creationId xmlns:a16="http://schemas.microsoft.com/office/drawing/2014/main" id="{0FACB848-B1BA-4167-8D7B-1A50CA8DC84F}"/>
               </a:ext>
             </a:extLst>
           </p:cNvPr>
@@ -4137,8 +6333,8 @@
           <a:lstStyle/>
           <a:p>
             <a:r>
-              <a:rPr lang="en-CH" dirty="0"/>
-              <a:t>Monte Carlo Simulation</a:t>
+              <a:rPr lang="en-CH" dirty="0" err="1"/>
+              <a:t>Wahrscheinlichkeitskette</a:t>
             </a:r>
             <a:endParaRPr lang="de-CH" dirty="0"/>
           </a:p>
@@ -4149,7 +6345,7 @@
           <p:cNvPr id="3" name="Content Placeholder 2">
             <a:extLst>
               <a:ext uri="{FF2B5EF4-FFF2-40B4-BE49-F238E27FC236}">
-                <a16:creationId xmlns:a16="http://schemas.microsoft.com/office/drawing/2014/main" id="{4E2E7064-02ED-49A7-AA6B-1FDDC1EC4EB8}"/>
+                <a16:creationId xmlns:a16="http://schemas.microsoft.com/office/drawing/2014/main" id="{B509DD07-A0A7-494C-BB9E-F5F187F03C1B}"/>
               </a:ext>
             </a:extLst>
           </p:cNvPr>
@@ -4167,15 +6363,7 @@
           <a:p>
             <a:r>
               <a:rPr lang="en-CH" dirty="0" err="1"/>
-              <a:t>Erzeugung</a:t>
-            </a:r>
-            <a:r>
-              <a:rPr lang="en-CH" dirty="0"/>
-              <a:t> von </a:t>
-            </a:r>
-            <a:r>
-              <a:rPr lang="en-CH" dirty="0" err="1"/>
-              <a:t>neuen</a:t>
+              <a:t>Wahrscheinlichkeitskette</a:t>
             </a:r>
             <a:r>
               <a:rPr lang="en-CH" dirty="0"/>
@@ -4183,7 +6371,7 @@
             </a:r>
             <a:r>
               <a:rPr lang="en-CH" dirty="0" err="1"/>
-              <a:t>Werten</a:t>
+              <a:t>aus</a:t>
             </a:r>
             <a:r>
               <a:rPr lang="en-CH" dirty="0"/>
@@ -4191,30 +6379,16 @@
             </a:r>
             <a:r>
               <a:rPr lang="en-CH" dirty="0" err="1"/>
-              <a:t>mittels</a:t>
+              <a:t>kausaler</a:t>
             </a:r>
             <a:r>
               <a:rPr lang="en-CH" dirty="0"/>
               <a:t> </a:t>
             </a:r>
             <a:r>
-              <a:rPr lang="en-CH" dirty="0" err="1"/>
-              <a:t>Verteilungsparameter</a:t>
-            </a:r>
-            <a:r>
-              <a:rPr lang="en-CH" dirty="0"/>
-              <a:t> und </a:t>
-            </a:r>
-            <a:r>
-              <a:rPr lang="en-CH" dirty="0" err="1"/>
-              <a:t>Verteilungen</a:t>
-            </a:r>
-            <a:endParaRPr lang="en-CH" dirty="0"/>
-          </a:p>
-          <a:p>
-            <a:endParaRPr lang="en-CH" dirty="0"/>
-          </a:p>
-          <a:p>
+              <a:rPr lang="en-CH"/>
+              <a:t>Ereigniskette</a:t>
+            </a:r>
             <a:endParaRPr lang="de-CH" dirty="0"/>
           </a:p>
         </p:txBody>
@@ -4222,7 +6396,7 @@
     </p:spTree>
     <p:extLst>
       <p:ext uri="{BB962C8B-B14F-4D97-AF65-F5344CB8AC3E}">
-        <p14:creationId xmlns:p14="http://schemas.microsoft.com/office/powerpoint/2010/main" val="950212034"/>
+        <p14:creationId xmlns:p14="http://schemas.microsoft.com/office/powerpoint/2010/main" val="1608520051"/>
       </p:ext>
     </p:extLst>
   </p:cSld>
@@ -4254,7 +6428,7 @@
           <p:cNvPr id="2" name="Title 1">
             <a:extLst>
               <a:ext uri="{FF2B5EF4-FFF2-40B4-BE49-F238E27FC236}">
-                <a16:creationId xmlns:a16="http://schemas.microsoft.com/office/drawing/2014/main" id="{0FACB848-B1BA-4167-8D7B-1A50CA8DC84F}"/>
+                <a16:creationId xmlns:a16="http://schemas.microsoft.com/office/drawing/2014/main" id="{17A790C2-2DD6-483E-B387-6989EF760951}"/>
               </a:ext>
             </a:extLst>
           </p:cNvPr>
@@ -4271,8 +6445,8 @@
           <a:lstStyle/>
           <a:p>
             <a:r>
-              <a:rPr lang="en-CH" dirty="0" err="1"/>
-              <a:t>Wahrscheinlichkeitskette</a:t>
+              <a:rPr lang="en-CH" dirty="0"/>
+              <a:t>Python</a:t>
             </a:r>
             <a:endParaRPr lang="de-CH" dirty="0"/>
           </a:p>
@@ -4283,7 +6457,7 @@
           <p:cNvPr id="3" name="Content Placeholder 2">
             <a:extLst>
               <a:ext uri="{FF2B5EF4-FFF2-40B4-BE49-F238E27FC236}">
-                <a16:creationId xmlns:a16="http://schemas.microsoft.com/office/drawing/2014/main" id="{B509DD07-A0A7-494C-BB9E-F5F187F03C1B}"/>
+                <a16:creationId xmlns:a16="http://schemas.microsoft.com/office/drawing/2014/main" id="{12678806-2259-4CF4-9E4A-27E0FDDBCD3C}"/>
               </a:ext>
             </a:extLst>
           </p:cNvPr>
@@ -4296,12 +6470,26 @@
         </p:nvSpPr>
         <p:spPr/>
         <p:txBody>
-          <a:bodyPr/>
+          <a:bodyPr>
+            <a:normAutofit fontScale="92500" lnSpcReduction="20000"/>
+          </a:bodyPr>
           <a:lstStyle/>
           <a:p>
             <a:r>
-              <a:rPr lang="en-CH" dirty="0" err="1"/>
-              <a:t>Wahrscheinlichkeitskette</a:t>
+              <a:rPr lang="de-CH" dirty="0"/>
+              <a:t>P</a:t>
+            </a:r>
+            <a:r>
+              <a:rPr lang="en-CH" dirty="0" err="1"/>
+              <a:t>andas</a:t>
+            </a:r>
+            <a:endParaRPr lang="en-CH" dirty="0"/>
+          </a:p>
+          <a:p>
+            <a:pPr lvl="1"/>
+            <a:r>
+              <a:rPr lang="en-CH" dirty="0" err="1"/>
+              <a:t>Daten</a:t>
             </a:r>
             <a:r>
               <a:rPr lang="en-CH" dirty="0"/>
@@ -4309,32 +6497,186 @@
             </a:r>
             <a:r>
               <a:rPr lang="en-CH" dirty="0" err="1"/>
-              <a:t>aus</a:t>
+              <a:t>lesen</a:t>
             </a:r>
             <a:r>
               <a:rPr lang="en-CH" dirty="0"/>
               <a:t> </a:t>
             </a:r>
-            <a:r>
-              <a:rPr lang="en-CH" dirty="0" err="1"/>
-              <a:t>kausaler</a:t>
+          </a:p>
+          <a:p>
+            <a:pPr lvl="1"/>
+            <a:r>
+              <a:rPr lang="en-CH" dirty="0" err="1"/>
+              <a:t>Daten</a:t>
             </a:r>
             <a:r>
               <a:rPr lang="en-CH" dirty="0"/>
               <a:t> </a:t>
             </a:r>
             <a:r>
-              <a:rPr lang="en-CH"/>
-              <a:t>Ereigniskette</a:t>
-            </a:r>
-            <a:endParaRPr lang="de-CH" dirty="0"/>
+              <a:rPr lang="en-CH" dirty="0" err="1"/>
+              <a:t>cleanen</a:t>
+            </a:r>
+            <a:endParaRPr lang="en-CH" dirty="0"/>
+          </a:p>
+          <a:p>
+            <a:pPr lvl="1"/>
+            <a:r>
+              <a:rPr lang="en-CH" dirty="0" err="1"/>
+              <a:t>Daten</a:t>
+            </a:r>
+            <a:r>
+              <a:rPr lang="en-CH" dirty="0"/>
+              <a:t> </a:t>
+            </a:r>
+            <a:r>
+              <a:rPr lang="en-CH" dirty="0" err="1"/>
+              <a:t>ergänzen</a:t>
+            </a:r>
+            <a:endParaRPr lang="en-CH" dirty="0"/>
+          </a:p>
+          <a:p>
+            <a:r>
+              <a:rPr lang="de-CH" dirty="0"/>
+              <a:t>N</a:t>
+            </a:r>
+            <a:r>
+              <a:rPr lang="en-CH" dirty="0" err="1"/>
+              <a:t>umpy</a:t>
+            </a:r>
+            <a:endParaRPr lang="en-CH" dirty="0"/>
+          </a:p>
+          <a:p>
+            <a:pPr lvl="1"/>
+            <a:r>
+              <a:rPr lang="en-CH" dirty="0" err="1"/>
+              <a:t>Ergänzungsfunktionen</a:t>
+            </a:r>
+            <a:r>
+              <a:rPr lang="en-CH" dirty="0"/>
+              <a:t> für Pandas arrays</a:t>
+            </a:r>
+          </a:p>
+          <a:p>
+            <a:pPr lvl="1"/>
+            <a:r>
+              <a:rPr lang="en-CH" dirty="0" err="1"/>
+              <a:t>Verteilungsparameter</a:t>
+            </a:r>
+            <a:r>
+              <a:rPr lang="en-CH" dirty="0"/>
+              <a:t> </a:t>
+            </a:r>
+            <a:r>
+              <a:rPr lang="en-CH" dirty="0" err="1"/>
+              <a:t>bestimmen</a:t>
+            </a:r>
+            <a:endParaRPr lang="en-CH" dirty="0"/>
+          </a:p>
+          <a:p>
+            <a:pPr lvl="1"/>
+            <a:r>
+              <a:rPr lang="de-CH" dirty="0"/>
+              <a:t>S</a:t>
+            </a:r>
+            <a:r>
+              <a:rPr lang="en-CH" dirty="0" err="1"/>
+              <a:t>imulationswerte</a:t>
+            </a:r>
+            <a:r>
+              <a:rPr lang="en-CH" dirty="0"/>
+              <a:t> </a:t>
+            </a:r>
+            <a:r>
+              <a:rPr lang="en-CH" dirty="0" err="1"/>
+              <a:t>erstellen</a:t>
+            </a:r>
+            <a:endParaRPr lang="en-CH" dirty="0"/>
+          </a:p>
+          <a:p>
+            <a:r>
+              <a:rPr lang="de-CH" dirty="0"/>
+              <a:t>S</a:t>
+            </a:r>
+            <a:r>
+              <a:rPr lang="en-CH" dirty="0" err="1"/>
+              <a:t>cipy</a:t>
+            </a:r>
+            <a:endParaRPr lang="en-CH" dirty="0"/>
+          </a:p>
+          <a:p>
+            <a:pPr lvl="1"/>
+            <a:r>
+              <a:rPr lang="en-CH" dirty="0"/>
+              <a:t>K</a:t>
+            </a:r>
+            <a:r>
+              <a:rPr lang="de-CH" dirty="0"/>
+              <a:t>olmogorov </a:t>
+            </a:r>
+            <a:r>
+              <a:rPr lang="en-CH" dirty="0"/>
+              <a:t>S</a:t>
+            </a:r>
+            <a:r>
+              <a:rPr lang="de-CH" dirty="0"/>
+              <a:t>mirnov </a:t>
+            </a:r>
+            <a:r>
+              <a:rPr lang="en-CH" dirty="0"/>
+              <a:t>T</a:t>
+            </a:r>
+            <a:r>
+              <a:rPr lang="de-CH" dirty="0"/>
+              <a:t>est</a:t>
+            </a:r>
+            <a:r>
+              <a:rPr lang="en-CH" dirty="0"/>
+              <a:t> </a:t>
+            </a:r>
+            <a:r>
+              <a:rPr lang="en-CH" dirty="0" err="1"/>
+              <a:t>durchführen</a:t>
+            </a:r>
+            <a:endParaRPr lang="en-CH" dirty="0"/>
+          </a:p>
+          <a:p>
+            <a:r>
+              <a:rPr lang="de-CH" dirty="0"/>
+              <a:t>M</a:t>
+            </a:r>
+            <a:r>
+              <a:rPr lang="en-CH" dirty="0" err="1"/>
+              <a:t>atplotlib</a:t>
+            </a:r>
+            <a:endParaRPr lang="en-CH" dirty="0"/>
+          </a:p>
+          <a:p>
+            <a:pPr lvl="1"/>
+            <a:r>
+              <a:rPr lang="en-CH" dirty="0" err="1"/>
+              <a:t>Plotten</a:t>
+            </a:r>
+            <a:r>
+              <a:rPr lang="en-CH" dirty="0"/>
+              <a:t> von </a:t>
+            </a:r>
+            <a:r>
+              <a:rPr lang="en-CH" dirty="0" err="1"/>
+              <a:t>Verteilungen</a:t>
+            </a:r>
+            <a:endParaRPr lang="en-CH" dirty="0"/>
+          </a:p>
+          <a:p>
+            <a:endParaRPr lang="en-CH" dirty="0"/>
           </a:p>
         </p:txBody>
       </p:sp>
     </p:spTree>
     <p:extLst>
       <p:ext uri="{BB962C8B-B14F-4D97-AF65-F5344CB8AC3E}">
-        <p14:creationId xmlns:p14="http://schemas.microsoft.com/office/powerpoint/2010/main" val="1608520051"/>
+        <p14:creationId xmlns:p14="http://schemas.microsoft.com/office/powerpoint/2010/main" val="3901308089"/>
       </p:ext>
     </p:extLst>
   </p:cSld>
@@ -4637,4 +6979,299 @@
     </a:ext>
   </a:extLst>
 </a:theme>
+</file>
+
+<file path=ppt/theme/theme2.xml><?xml version="1.0" encoding="utf-8"?>
+<a:theme xmlns:a="http://schemas.openxmlformats.org/drawingml/2006/main" name="Office Theme">
+  <a:themeElements>
+    <a:clrScheme name="Office">
+      <a:dk1>
+        <a:sysClr val="windowText" lastClr="000000"/>
+      </a:dk1>
+      <a:lt1>
+        <a:sysClr val="window" lastClr="FFFFFF"/>
+      </a:lt1>
+      <a:dk2>
+        <a:srgbClr val="44546A"/>
+      </a:dk2>
+      <a:lt2>
+        <a:srgbClr val="E7E6E6"/>
+      </a:lt2>
+      <a:accent1>
+        <a:srgbClr val="4472C4"/>
+      </a:accent1>
+      <a:accent2>
+        <a:srgbClr val="ED7D31"/>
+      </a:accent2>
+      <a:accent3>
+        <a:srgbClr val="A5A5A5"/>
+      </a:accent3>
+      <a:accent4>
+        <a:srgbClr val="FFC000"/>
+      </a:accent4>
+      <a:accent5>
+        <a:srgbClr val="5B9BD5"/>
+      </a:accent5>
+      <a:accent6>
+        <a:srgbClr val="70AD47"/>
+      </a:accent6>
+      <a:hlink>
+        <a:srgbClr val="0563C1"/>
+      </a:hlink>
+      <a:folHlink>
+        <a:srgbClr val="954F72"/>
+      </a:folHlink>
+    </a:clrScheme>
+    <a:fontScheme name="Office">
+      <a:majorFont>
+        <a:latin typeface="Calibri Light" panose="020F0302020204030204"/>
+        <a:ea typeface=""/>
+        <a:cs typeface=""/>
+        <a:font script="Jpan" typeface="游ゴシック Light"/>
+        <a:font script="Hang" typeface="맑은 고딕"/>
+        <a:font script="Hans" typeface="等线 Light"/>
+        <a:font script="Hant" typeface="新細明體"/>
+        <a:font script="Arab" typeface="Times New Roman"/>
+        <a:font script="Hebr" typeface="Times New Roman"/>
+        <a:font script="Thai" typeface="Angsana New"/>
+        <a:font script="Ethi" typeface="Nyala"/>
+        <a:font script="Beng" typeface="Vrinda"/>
+        <a:font script="Gujr" typeface="Shruti"/>
+        <a:font script="Khmr" typeface="MoolBoran"/>
+        <a:font script="Knda" typeface="Tunga"/>
+        <a:font script="Guru" typeface="Raavi"/>
+        <a:font script="Cans" typeface="Euphemia"/>
+        <a:font script="Cher" typeface="Plantagenet Cherokee"/>
+        <a:font script="Yiii" typeface="Microsoft Yi Baiti"/>
+        <a:font script="Tibt" typeface="Microsoft Himalaya"/>
+        <a:font script="Thaa" typeface="MV Boli"/>
+        <a:font script="Deva" typeface="Mangal"/>
+        <a:font script="Telu" typeface="Gautami"/>
+        <a:font script="Taml" typeface="Latha"/>
+        <a:font script="Syrc" typeface="Estrangelo Edessa"/>
+        <a:font script="Orya" typeface="Kalinga"/>
+        <a:font script="Mlym" typeface="Kartika"/>
+        <a:font script="Laoo" typeface="DokChampa"/>
+        <a:font script="Sinh" typeface="Iskoola Pota"/>
+        <a:font script="Mong" typeface="Mongolian Baiti"/>
+        <a:font script="Viet" typeface="Times New Roman"/>
+        <a:font script="Uigh" typeface="Microsoft Uighur"/>
+        <a:font script="Geor" typeface="Sylfaen"/>
+        <a:font script="Armn" typeface="Arial"/>
+        <a:font script="Bugi" typeface="Leelawadee UI"/>
+        <a:font script="Bopo" typeface="Microsoft JhengHei"/>
+        <a:font script="Java" typeface="Javanese Text"/>
+        <a:font script="Lisu" typeface="Segoe UI"/>
+        <a:font script="Mymr" typeface="Myanmar Text"/>
+        <a:font script="Nkoo" typeface="Ebrima"/>
+        <a:font script="Olck" typeface="Nirmala UI"/>
+        <a:font script="Osma" typeface="Ebrima"/>
+        <a:font script="Phag" typeface="Phagspa"/>
+        <a:font script="Syrn" typeface="Estrangelo Edessa"/>
+        <a:font script="Syrj" typeface="Estrangelo Edessa"/>
+        <a:font script="Syre" typeface="Estrangelo Edessa"/>
+        <a:font script="Sora" typeface="Nirmala UI"/>
+        <a:font script="Tale" typeface="Microsoft Tai Le"/>
+        <a:font script="Talu" typeface="Microsoft New Tai Lue"/>
+        <a:font script="Tfng" typeface="Ebrima"/>
+      </a:majorFont>
+      <a:minorFont>
+        <a:latin typeface="Calibri" panose="020F0502020204030204"/>
+        <a:ea typeface=""/>
+        <a:cs typeface=""/>
+        <a:font script="Jpan" typeface="游ゴシック"/>
+        <a:font script="Hang" typeface="맑은 고딕"/>
+        <a:font script="Hans" typeface="等线"/>
+        <a:font script="Hant" typeface="新細明體"/>
+        <a:font script="Arab" typeface="Arial"/>
+        <a:font script="Hebr" typeface="Arial"/>
+        <a:font script="Thai" typeface="Cordia New"/>
+        <a:font script="Ethi" typeface="Nyala"/>
+        <a:font script="Beng" typeface="Vrinda"/>
+        <a:font script="Gujr" typeface="Shruti"/>
+        <a:font script="Khmr" typeface="DaunPenh"/>
+        <a:font script="Knda" typeface="Tunga"/>
+        <a:font script="Guru" typeface="Raavi"/>
+        <a:font script="Cans" typeface="Euphemia"/>
+        <a:font script="Cher" typeface="Plantagenet Cherokee"/>
+        <a:font script="Yiii" typeface="Microsoft Yi Baiti"/>
+        <a:font script="Tibt" typeface="Microsoft Himalaya"/>
+        <a:font script="Thaa" typeface="MV Boli"/>
+        <a:font script="Deva" typeface="Mangal"/>
+        <a:font script="Telu" typeface="Gautami"/>
+        <a:font script="Taml" typeface="Latha"/>
+        <a:font script="Syrc" typeface="Estrangelo Edessa"/>
+        <a:font script="Orya" typeface="Kalinga"/>
+        <a:font script="Mlym" typeface="Kartika"/>
+        <a:font script="Laoo" typeface="DokChampa"/>
+        <a:font script="Sinh" typeface="Iskoola Pota"/>
+        <a:font script="Mong" typeface="Mongolian Baiti"/>
+        <a:font script="Viet" typeface="Arial"/>
+        <a:font script="Uigh" typeface="Microsoft Uighur"/>
+        <a:font script="Geor" typeface="Sylfaen"/>
+        <a:font script="Armn" typeface="Arial"/>
+        <a:font script="Bugi" typeface="Leelawadee UI"/>
+        <a:font script="Bopo" typeface="Microsoft JhengHei"/>
+        <a:font script="Java" typeface="Javanese Text"/>
+        <a:font script="Lisu" typeface="Segoe UI"/>
+        <a:font script="Mymr" typeface="Myanmar Text"/>
+        <a:font script="Nkoo" typeface="Ebrima"/>
+        <a:font script="Olck" typeface="Nirmala UI"/>
+        <a:font script="Osma" typeface="Ebrima"/>
+        <a:font script="Phag" typeface="Phagspa"/>
+        <a:font script="Syrn" typeface="Estrangelo Edessa"/>
+        <a:font script="Syrj" typeface="Estrangelo Edessa"/>
+        <a:font script="Syre" typeface="Estrangelo Edessa"/>
+        <a:font script="Sora" typeface="Nirmala UI"/>
+        <a:font script="Tale" typeface="Microsoft Tai Le"/>
+        <a:font script="Talu" typeface="Microsoft New Tai Lue"/>
+        <a:font script="Tfng" typeface="Ebrima"/>
+      </a:minorFont>
+    </a:fontScheme>
+    <a:fmtScheme name="Office">
+      <a:fillStyleLst>
+        <a:solidFill>
+          <a:schemeClr val="phClr"/>
+        </a:solidFill>
+        <a:gradFill rotWithShape="1">
+          <a:gsLst>
+            <a:gs pos="0">
+              <a:schemeClr val="phClr">
+                <a:lumMod val="110000"/>
+                <a:satMod val="105000"/>
+                <a:tint val="67000"/>
+              </a:schemeClr>
+            </a:gs>
+            <a:gs pos="50000">
+              <a:schemeClr val="phClr">
+                <a:lumMod val="105000"/>
+                <a:satMod val="103000"/>
+                <a:tint val="73000"/>
+              </a:schemeClr>
+            </a:gs>
+            <a:gs pos="100000">
+              <a:schemeClr val="phClr">
+                <a:lumMod val="105000"/>
+                <a:satMod val="109000"/>
+                <a:tint val="81000"/>
+              </a:schemeClr>
+            </a:gs>
+          </a:gsLst>
+          <a:lin ang="5400000" scaled="0"/>
+        </a:gradFill>
+        <a:gradFill rotWithShape="1">
+          <a:gsLst>
+            <a:gs pos="0">
+              <a:schemeClr val="phClr">
+                <a:satMod val="103000"/>
+                <a:lumMod val="102000"/>
+                <a:tint val="94000"/>
+              </a:schemeClr>
+            </a:gs>
+            <a:gs pos="50000">
+              <a:schemeClr val="phClr">
+                <a:satMod val="110000"/>
+                <a:lumMod val="100000"/>
+                <a:shade val="100000"/>
+              </a:schemeClr>
+            </a:gs>
+            <a:gs pos="100000">
+              <a:schemeClr val="phClr">
+                <a:lumMod val="99000"/>
+                <a:satMod val="120000"/>
+                <a:shade val="78000"/>
+              </a:schemeClr>
+            </a:gs>
+          </a:gsLst>
+          <a:lin ang="5400000" scaled="0"/>
+        </a:gradFill>
+      </a:fillStyleLst>
+      <a:lnStyleLst>
+        <a:ln w="6350" cap="flat" cmpd="sng" algn="ctr">
+          <a:solidFill>
+            <a:schemeClr val="phClr"/>
+          </a:solidFill>
+          <a:prstDash val="solid"/>
+          <a:miter lim="800000"/>
+        </a:ln>
+        <a:ln w="12700" cap="flat" cmpd="sng" algn="ctr">
+          <a:solidFill>
+            <a:schemeClr val="phClr"/>
+          </a:solidFill>
+          <a:prstDash val="solid"/>
+          <a:miter lim="800000"/>
+        </a:ln>
+        <a:ln w="19050" cap="flat" cmpd="sng" algn="ctr">
+          <a:solidFill>
+            <a:schemeClr val="phClr"/>
+          </a:solidFill>
+          <a:prstDash val="solid"/>
+          <a:miter lim="800000"/>
+        </a:ln>
+      </a:lnStyleLst>
+      <a:effectStyleLst>
+        <a:effectStyle>
+          <a:effectLst/>
+        </a:effectStyle>
+        <a:effectStyle>
+          <a:effectLst/>
+        </a:effectStyle>
+        <a:effectStyle>
+          <a:effectLst>
+            <a:outerShdw blurRad="57150" dist="19050" dir="5400000" algn="ctr" rotWithShape="0">
+              <a:srgbClr val="000000">
+                <a:alpha val="63000"/>
+              </a:srgbClr>
+            </a:outerShdw>
+          </a:effectLst>
+        </a:effectStyle>
+      </a:effectStyleLst>
+      <a:bgFillStyleLst>
+        <a:solidFill>
+          <a:schemeClr val="phClr"/>
+        </a:solidFill>
+        <a:solidFill>
+          <a:schemeClr val="phClr">
+            <a:tint val="95000"/>
+            <a:satMod val="170000"/>
+          </a:schemeClr>
+        </a:solidFill>
+        <a:gradFill rotWithShape="1">
+          <a:gsLst>
+            <a:gs pos="0">
+              <a:schemeClr val="phClr">
+                <a:tint val="93000"/>
+                <a:satMod val="150000"/>
+                <a:shade val="98000"/>
+                <a:lumMod val="102000"/>
+              </a:schemeClr>
+            </a:gs>
+            <a:gs pos="50000">
+              <a:schemeClr val="phClr">
+                <a:tint val="98000"/>
+                <a:satMod val="130000"/>
+                <a:shade val="90000"/>
+                <a:lumMod val="103000"/>
+              </a:schemeClr>
+            </a:gs>
+            <a:gs pos="100000">
+              <a:schemeClr val="phClr">
+                <a:shade val="63000"/>
+                <a:satMod val="120000"/>
+              </a:schemeClr>
+            </a:gs>
+          </a:gsLst>
+          <a:lin ang="5400000" scaled="0"/>
+        </a:gradFill>
+      </a:bgFillStyleLst>
+    </a:fmtScheme>
+  </a:themeElements>
+  <a:objectDefaults/>
+  <a:extraClrSchemeLst/>
+  <a:extLst>
+    <a:ext uri="{05A4C25C-085E-4340-85A3-A5531E510DB2}">
+      <thm15:themeFamily xmlns:thm15="http://schemas.microsoft.com/office/thememl/2012/main" name="Office Theme" id="{62F939B6-93AF-4DB8-9C6B-D6C7DFDC589F}" vid="{4A3C46E8-61CC-4603-A589-7422A47A8E4A}"/>
+    </a:ext>
+  </a:extLst>
+</a:theme>
 </file>
</xml_diff>